<commit_message>
presentation updated and images added
</commit_message>
<xml_diff>
--- a/Presentation/Designing an aircraft tracking datastore.pptx
+++ b/Presentation/Designing an aircraft tracking datastore.pptx
@@ -8,6 +8,10 @@
     <p:sldId id="256" r:id="rId2"/>
     <p:sldId id="258" r:id="rId3"/>
     <p:sldId id="257" r:id="rId4"/>
+    <p:sldId id="263" r:id="rId5"/>
+    <p:sldId id="261" r:id="rId6"/>
+    <p:sldId id="260" r:id="rId7"/>
+    <p:sldId id="262" r:id="rId8"/>
   </p:sldIdLst>
   <p:sldSz cx="9144000" cy="6858000" type="screen4x3"/>
   <p:notesSz cx="6858000" cy="9144000"/>
@@ -3157,7 +3161,23 @@
           <a:p>
             <a:r>
               <a:rPr lang="nl-NL" dirty="0" smtClean="0"/>
-              <a:t>Hellmar Becker</a:t>
+              <a:t>A Small Big Data (</a:t>
+            </a:r>
+            <a:r>
+              <a:rPr lang="nl-NL" dirty="0" err="1" smtClean="0"/>
+              <a:t>and</a:t>
+            </a:r>
+            <a:r>
+              <a:rPr lang="nl-NL" dirty="0" smtClean="0"/>
+              <a:t> </a:t>
+            </a:r>
+            <a:r>
+              <a:rPr lang="nl-NL" dirty="0" err="1" smtClean="0"/>
+              <a:t>IoT</a:t>
+            </a:r>
+            <a:r>
+              <a:rPr lang="nl-NL" dirty="0" smtClean="0"/>
+              <a:t>) project</a:t>
             </a:r>
             <a:endParaRPr lang="nl-NL" dirty="0"/>
           </a:p>
@@ -3418,11 +3438,7 @@
           <a:p>
             <a:r>
               <a:rPr lang="nl-NL" dirty="0" smtClean="0"/>
-              <a:t>Data </a:t>
-            </a:r>
-            <a:r>
-              <a:rPr lang="nl-NL" dirty="0" err="1" smtClean="0"/>
-              <a:t>collection</a:t>
+              <a:t>Data format</a:t>
             </a:r>
             <a:endParaRPr lang="nl-NL" dirty="0"/>
           </a:p>
@@ -3496,8 +3512,98 @@
               <a:t>continuously</a:t>
             </a:r>
             <a:r>
-              <a:rPr lang="nl-NL" smtClean="0"/>
+              <a:rPr lang="nl-NL" dirty="0" smtClean="0"/>
               <a:t> at 1090 MHz</a:t>
+            </a:r>
+          </a:p>
+          <a:p>
+            <a:r>
+              <a:rPr lang="nl-NL" dirty="0" err="1" smtClean="0"/>
+              <a:t>Sparse</a:t>
+            </a:r>
+            <a:r>
+              <a:rPr lang="nl-NL" dirty="0" smtClean="0"/>
+              <a:t> data sets </a:t>
+            </a:r>
+            <a:r>
+              <a:rPr lang="nl-NL" dirty="0" err="1" smtClean="0"/>
+              <a:t>containing</a:t>
+            </a:r>
+            <a:r>
+              <a:rPr lang="nl-NL" dirty="0" smtClean="0"/>
+              <a:t> flight </a:t>
+            </a:r>
+            <a:r>
+              <a:rPr lang="nl-NL" dirty="0" err="1" smtClean="0"/>
+              <a:t>number</a:t>
+            </a:r>
+            <a:r>
+              <a:rPr lang="nl-NL" dirty="0" smtClean="0"/>
+              <a:t>, </a:t>
+            </a:r>
+            <a:r>
+              <a:rPr lang="nl-NL" dirty="0" err="1" smtClean="0"/>
+              <a:t>position</a:t>
+            </a:r>
+            <a:r>
+              <a:rPr lang="nl-NL" dirty="0" smtClean="0"/>
+              <a:t>, </a:t>
+            </a:r>
+            <a:r>
+              <a:rPr lang="nl-NL" dirty="0" err="1" smtClean="0"/>
+              <a:t>heading</a:t>
+            </a:r>
+            <a:r>
+              <a:rPr lang="nl-NL" dirty="0" smtClean="0"/>
+              <a:t>, speed, </a:t>
+            </a:r>
+            <a:r>
+              <a:rPr lang="nl-NL" dirty="0" err="1" smtClean="0"/>
+              <a:t>height</a:t>
+            </a:r>
+            <a:r>
+              <a:rPr lang="nl-NL" dirty="0" smtClean="0"/>
+              <a:t> – but </a:t>
+            </a:r>
+            <a:r>
+              <a:rPr lang="nl-NL" dirty="0" err="1" smtClean="0"/>
+              <a:t>not</a:t>
+            </a:r>
+            <a:r>
+              <a:rPr lang="nl-NL" dirty="0" smtClean="0"/>
+              <a:t> </a:t>
+            </a:r>
+            <a:r>
+              <a:rPr lang="nl-NL" dirty="0" err="1" smtClean="0"/>
+              <a:t>all</a:t>
+            </a:r>
+            <a:r>
+              <a:rPr lang="nl-NL" dirty="0" smtClean="0"/>
+              <a:t> </a:t>
+            </a:r>
+            <a:r>
+              <a:rPr lang="nl-NL" dirty="0" err="1" smtClean="0"/>
+              <a:t>fields</a:t>
+            </a:r>
+            <a:r>
+              <a:rPr lang="nl-NL" dirty="0" smtClean="0"/>
+              <a:t> are </a:t>
+            </a:r>
+            <a:r>
+              <a:rPr lang="nl-NL" dirty="0" err="1" smtClean="0"/>
+              <a:t>populated</a:t>
+            </a:r>
+            <a:r>
+              <a:rPr lang="nl-NL" dirty="0" smtClean="0"/>
+              <a:t> in </a:t>
+            </a:r>
+            <a:r>
+              <a:rPr lang="nl-NL" dirty="0" err="1" smtClean="0"/>
+              <a:t>every</a:t>
+            </a:r>
+            <a:r>
+              <a:rPr lang="nl-NL" dirty="0" smtClean="0"/>
+              <a:t> record</a:t>
             </a:r>
             <a:endParaRPr lang="nl-NL" dirty="0"/>
           </a:p>
@@ -3507,6 +3613,2993 @@
     <p:extLst>
       <p:ext uri="{BB962C8B-B14F-4D97-AF65-F5344CB8AC3E}">
         <p14:creationId xmlns:p14="http://schemas.microsoft.com/office/powerpoint/2010/main" val="1842831719"/>
+      </p:ext>
+    </p:extLst>
+  </p:cSld>
+  <p:clrMapOvr>
+    <a:masterClrMapping/>
+  </p:clrMapOvr>
+</p:sld>
+</file>
+
+<file path=ppt/slides/slide4.xml><?xml version="1.0" encoding="utf-8"?>
+<p:sld xmlns:a="http://schemas.openxmlformats.org/drawingml/2006/main" xmlns:r="http://schemas.openxmlformats.org/officeDocument/2006/relationships" xmlns:p="http://schemas.openxmlformats.org/presentationml/2006/main">
+  <p:cSld>
+    <p:spTree>
+      <p:nvGrpSpPr>
+        <p:cNvPr id="1" name=""/>
+        <p:cNvGrpSpPr/>
+        <p:nvPr/>
+      </p:nvGrpSpPr>
+      <p:grpSpPr>
+        <a:xfrm>
+          <a:off x="0" y="0"/>
+          <a:ext cx="0" cy="0"/>
+          <a:chOff x="0" y="0"/>
+          <a:chExt cx="0" cy="0"/>
+        </a:xfrm>
+      </p:grpSpPr>
+      <p:sp>
+        <p:nvSpPr>
+          <p:cNvPr id="2" name="Title 1"/>
+          <p:cNvSpPr>
+            <a:spLocks noGrp="1"/>
+          </p:cNvSpPr>
+          <p:nvPr>
+            <p:ph type="title"/>
+          </p:nvPr>
+        </p:nvSpPr>
+        <p:spPr/>
+        <p:txBody>
+          <a:bodyPr/>
+          <a:lstStyle/>
+          <a:p>
+            <a:r>
+              <a:rPr lang="nl-NL" dirty="0" smtClean="0"/>
+              <a:t>Data </a:t>
+            </a:r>
+            <a:r>
+              <a:rPr lang="nl-NL" dirty="0" err="1" smtClean="0"/>
+              <a:t>collection</a:t>
+            </a:r>
+            <a:endParaRPr lang="nl-NL" dirty="0"/>
+          </a:p>
+        </p:txBody>
+      </p:sp>
+      <p:sp>
+        <p:nvSpPr>
+          <p:cNvPr id="3" name="Content Placeholder 2"/>
+          <p:cNvSpPr>
+            <a:spLocks noGrp="1"/>
+          </p:cNvSpPr>
+          <p:nvPr>
+            <p:ph idx="1"/>
+          </p:nvPr>
+        </p:nvSpPr>
+        <p:spPr>
+          <a:xfrm>
+            <a:off x="2051720" y="3717032"/>
+            <a:ext cx="4186808" cy="1689051"/>
+          </a:xfrm>
+        </p:spPr>
+        <p:txBody>
+          <a:bodyPr>
+            <a:normAutofit lnSpcReduction="10000"/>
+          </a:bodyPr>
+          <a:lstStyle/>
+          <a:p>
+            <a:pPr marL="0" indent="0">
+              <a:buNone/>
+            </a:pPr>
+            <a:r>
+              <a:rPr lang="nl-NL" dirty="0" err="1" smtClean="0"/>
+              <a:t>Antenna</a:t>
+            </a:r>
+            <a:endParaRPr lang="nl-NL" dirty="0" smtClean="0"/>
+          </a:p>
+          <a:p>
+            <a:pPr marL="0" indent="0">
+              <a:buNone/>
+            </a:pPr>
+            <a:endParaRPr lang="nl-NL" dirty="0" smtClean="0"/>
+          </a:p>
+          <a:p>
+            <a:pPr marL="0" indent="0">
+              <a:buNone/>
+            </a:pPr>
+            <a:r>
+              <a:rPr lang="nl-NL" dirty="0" smtClean="0"/>
+              <a:t>     … </a:t>
+            </a:r>
+            <a:r>
+              <a:rPr lang="nl-NL" dirty="0" err="1" smtClean="0"/>
+              <a:t>and</a:t>
+            </a:r>
+            <a:r>
+              <a:rPr lang="nl-NL" dirty="0" smtClean="0"/>
+              <a:t> receiver</a:t>
+            </a:r>
+            <a:endParaRPr lang="nl-NL" dirty="0"/>
+          </a:p>
+        </p:txBody>
+      </p:sp>
+      <p:pic>
+        <p:nvPicPr>
+          <p:cNvPr id="4" name="Picture 2" descr="C:\Git\plt-airt-2000\Presentation\antenna.jpg"/>
+          <p:cNvPicPr>
+            <a:picLocks noChangeAspect="1" noChangeArrowheads="1"/>
+          </p:cNvPicPr>
+          <p:nvPr/>
+        </p:nvPicPr>
+        <p:blipFill>
+          <a:blip r:embed="rId2" cstate="print">
+            <a:extLst>
+              <a:ext uri="{28A0092B-C50C-407E-A947-70E740481C1C}">
+                <a14:useLocalDpi xmlns:a14="http://schemas.microsoft.com/office/drawing/2010/main" val="0"/>
+              </a:ext>
+            </a:extLst>
+          </a:blip>
+          <a:srcRect/>
+          <a:stretch>
+            <a:fillRect/>
+          </a:stretch>
+        </p:blipFill>
+        <p:spPr bwMode="auto">
+          <a:xfrm>
+            <a:off x="899593" y="1484784"/>
+            <a:ext cx="3592224" cy="2016224"/>
+          </a:xfrm>
+          <a:prstGeom prst="rect">
+            <a:avLst/>
+          </a:prstGeom>
+          <a:noFill/>
+          <a:extLst>
+            <a:ext uri="{909E8E84-426E-40DD-AFC4-6F175D3DCCD1}">
+              <a14:hiddenFill xmlns:a14="http://schemas.microsoft.com/office/drawing/2010/main">
+                <a:solidFill>
+                  <a:srgbClr val="FFFFFF"/>
+                </a:solidFill>
+              </a14:hiddenFill>
+            </a:ext>
+          </a:extLst>
+        </p:spPr>
+      </p:pic>
+      <p:pic>
+        <p:nvPicPr>
+          <p:cNvPr id="5" name="Picture 3" descr="C:\Git\plt-airt-2000\Presentation\receiver.jpg"/>
+          <p:cNvPicPr>
+            <a:picLocks noChangeAspect="1" noChangeArrowheads="1"/>
+          </p:cNvPicPr>
+          <p:nvPr/>
+        </p:nvPicPr>
+        <p:blipFill>
+          <a:blip r:embed="rId3" cstate="print">
+            <a:extLst>
+              <a:ext uri="{28A0092B-C50C-407E-A947-70E740481C1C}">
+                <a14:useLocalDpi xmlns:a14="http://schemas.microsoft.com/office/drawing/2010/main" val="0"/>
+              </a:ext>
+            </a:extLst>
+          </a:blip>
+          <a:srcRect/>
+          <a:stretch>
+            <a:fillRect/>
+          </a:stretch>
+        </p:blipFill>
+        <p:spPr bwMode="auto">
+          <a:xfrm>
+            <a:off x="5292080" y="1484784"/>
+            <a:ext cx="2376264" cy="4233692"/>
+          </a:xfrm>
+          <a:prstGeom prst="rect">
+            <a:avLst/>
+          </a:prstGeom>
+          <a:noFill/>
+          <a:extLst>
+            <a:ext uri="{909E8E84-426E-40DD-AFC4-6F175D3DCCD1}">
+              <a14:hiddenFill xmlns:a14="http://schemas.microsoft.com/office/drawing/2010/main">
+                <a:solidFill>
+                  <a:srgbClr val="FFFFFF"/>
+                </a:solidFill>
+              </a14:hiddenFill>
+            </a:ext>
+          </a:extLst>
+        </p:spPr>
+      </p:pic>
+    </p:spTree>
+    <p:extLst>
+      <p:ext uri="{BB962C8B-B14F-4D97-AF65-F5344CB8AC3E}">
+        <p14:creationId xmlns:p14="http://schemas.microsoft.com/office/powerpoint/2010/main" val="2625320855"/>
+      </p:ext>
+    </p:extLst>
+  </p:cSld>
+  <p:clrMapOvr>
+    <a:masterClrMapping/>
+  </p:clrMapOvr>
+</p:sld>
+</file>
+
+<file path=ppt/slides/slide5.xml><?xml version="1.0" encoding="utf-8"?>
+<p:sld xmlns:a="http://schemas.openxmlformats.org/drawingml/2006/main" xmlns:r="http://schemas.openxmlformats.org/officeDocument/2006/relationships" xmlns:p="http://schemas.openxmlformats.org/presentationml/2006/main">
+  <p:cSld>
+    <p:spTree>
+      <p:nvGrpSpPr>
+        <p:cNvPr id="1" name=""/>
+        <p:cNvGrpSpPr/>
+        <p:nvPr/>
+      </p:nvGrpSpPr>
+      <p:grpSpPr>
+        <a:xfrm>
+          <a:off x="0" y="0"/>
+          <a:ext cx="0" cy="0"/>
+          <a:chOff x="0" y="0"/>
+          <a:chExt cx="0" cy="0"/>
+        </a:xfrm>
+      </p:grpSpPr>
+      <p:sp>
+        <p:nvSpPr>
+          <p:cNvPr id="2" name="Title 1"/>
+          <p:cNvSpPr>
+            <a:spLocks noGrp="1"/>
+          </p:cNvSpPr>
+          <p:nvPr>
+            <p:ph type="title"/>
+          </p:nvPr>
+        </p:nvSpPr>
+        <p:spPr/>
+        <p:txBody>
+          <a:bodyPr/>
+          <a:lstStyle/>
+          <a:p>
+            <a:r>
+              <a:rPr lang="nl-NL" dirty="0" smtClean="0"/>
+              <a:t>Data Flow</a:t>
+            </a:r>
+            <a:endParaRPr lang="nl-NL" dirty="0"/>
+          </a:p>
+        </p:txBody>
+      </p:sp>
+      <p:sp>
+        <p:nvSpPr>
+          <p:cNvPr id="4" name="Flowchart: Process 3"/>
+          <p:cNvSpPr/>
+          <p:nvPr/>
+        </p:nvSpPr>
+        <p:spPr>
+          <a:xfrm>
+            <a:off x="683568" y="1628800"/>
+            <a:ext cx="1512168" cy="504056"/>
+          </a:xfrm>
+          <a:prstGeom prst="flowChartProcess">
+            <a:avLst/>
+          </a:prstGeom>
+          <a:noFill/>
+        </p:spPr>
+        <p:style>
+          <a:lnRef idx="2">
+            <a:schemeClr val="accent1">
+              <a:shade val="50000"/>
+            </a:schemeClr>
+          </a:lnRef>
+          <a:fillRef idx="1">
+            <a:schemeClr val="accent1"/>
+          </a:fillRef>
+          <a:effectRef idx="0">
+            <a:schemeClr val="accent1"/>
+          </a:effectRef>
+          <a:fontRef idx="minor">
+            <a:schemeClr val="lt1"/>
+          </a:fontRef>
+        </p:style>
+        <p:txBody>
+          <a:bodyPr rtlCol="0" anchor="ctr"/>
+          <a:lstStyle/>
+          <a:p>
+            <a:pPr algn="ctr"/>
+            <a:r>
+              <a:rPr lang="nl-NL" dirty="0" smtClean="0">
+                <a:solidFill>
+                  <a:schemeClr val="tx1"/>
+                </a:solidFill>
+              </a:rPr>
+              <a:t>Source (Receiver)</a:t>
+            </a:r>
+            <a:endParaRPr lang="nl-NL" dirty="0">
+              <a:solidFill>
+                <a:schemeClr val="tx1"/>
+              </a:solidFill>
+            </a:endParaRPr>
+          </a:p>
+        </p:txBody>
+      </p:sp>
+      <p:sp>
+        <p:nvSpPr>
+          <p:cNvPr id="6" name="Flowchart: Process 5"/>
+          <p:cNvSpPr/>
+          <p:nvPr/>
+        </p:nvSpPr>
+        <p:spPr>
+          <a:xfrm>
+            <a:off x="683568" y="2420888"/>
+            <a:ext cx="1512168" cy="504056"/>
+          </a:xfrm>
+          <a:prstGeom prst="flowChartProcess">
+            <a:avLst/>
+          </a:prstGeom>
+          <a:noFill/>
+        </p:spPr>
+        <p:style>
+          <a:lnRef idx="2">
+            <a:schemeClr val="accent1">
+              <a:shade val="50000"/>
+            </a:schemeClr>
+          </a:lnRef>
+          <a:fillRef idx="1">
+            <a:schemeClr val="accent1"/>
+          </a:fillRef>
+          <a:effectRef idx="0">
+            <a:schemeClr val="accent1"/>
+          </a:effectRef>
+          <a:fontRef idx="minor">
+            <a:schemeClr val="lt1"/>
+          </a:fontRef>
+        </p:style>
+        <p:txBody>
+          <a:bodyPr rtlCol="0" anchor="ctr"/>
+          <a:lstStyle/>
+          <a:p>
+            <a:pPr algn="ctr"/>
+            <a:r>
+              <a:rPr lang="nl-NL" dirty="0" smtClean="0">
+                <a:solidFill>
+                  <a:schemeClr val="tx1"/>
+                </a:solidFill>
+              </a:rPr>
+              <a:t>Source (Receiver)</a:t>
+            </a:r>
+            <a:endParaRPr lang="nl-NL" dirty="0">
+              <a:solidFill>
+                <a:schemeClr val="tx1"/>
+              </a:solidFill>
+            </a:endParaRPr>
+          </a:p>
+        </p:txBody>
+      </p:sp>
+      <p:sp>
+        <p:nvSpPr>
+          <p:cNvPr id="7" name="Flowchart: Process 6"/>
+          <p:cNvSpPr/>
+          <p:nvPr/>
+        </p:nvSpPr>
+        <p:spPr>
+          <a:xfrm>
+            <a:off x="4427984" y="2852936"/>
+            <a:ext cx="3672408" cy="504056"/>
+          </a:xfrm>
+          <a:prstGeom prst="flowChartProcess">
+            <a:avLst/>
+          </a:prstGeom>
+          <a:noFill/>
+        </p:spPr>
+        <p:style>
+          <a:lnRef idx="2">
+            <a:schemeClr val="accent1">
+              <a:shade val="50000"/>
+            </a:schemeClr>
+          </a:lnRef>
+          <a:fillRef idx="1">
+            <a:schemeClr val="accent1"/>
+          </a:fillRef>
+          <a:effectRef idx="0">
+            <a:schemeClr val="accent1"/>
+          </a:effectRef>
+          <a:fontRef idx="minor">
+            <a:schemeClr val="lt1"/>
+          </a:fontRef>
+        </p:style>
+        <p:txBody>
+          <a:bodyPr rtlCol="0" anchor="ctr"/>
+          <a:lstStyle/>
+          <a:p>
+            <a:pPr algn="ctr"/>
+            <a:r>
+              <a:rPr lang="nl-NL" dirty="0" err="1" smtClean="0">
+                <a:solidFill>
+                  <a:schemeClr val="tx1"/>
+                </a:solidFill>
+              </a:rPr>
+              <a:t>Coalesce</a:t>
+            </a:r>
+            <a:r>
+              <a:rPr lang="nl-NL" dirty="0" smtClean="0">
+                <a:solidFill>
+                  <a:schemeClr val="tx1"/>
+                </a:solidFill>
+              </a:rPr>
+              <a:t> / complete data </a:t>
+            </a:r>
+            <a:r>
+              <a:rPr lang="nl-NL" dirty="0" err="1" smtClean="0">
+                <a:solidFill>
+                  <a:schemeClr val="tx1"/>
+                </a:solidFill>
+              </a:rPr>
+              <a:t>rows</a:t>
+            </a:r>
+            <a:endParaRPr lang="nl-NL" dirty="0">
+              <a:solidFill>
+                <a:schemeClr val="tx1"/>
+              </a:solidFill>
+            </a:endParaRPr>
+          </a:p>
+        </p:txBody>
+      </p:sp>
+      <p:sp>
+        <p:nvSpPr>
+          <p:cNvPr id="8" name="Flowchart: Process 7"/>
+          <p:cNvSpPr/>
+          <p:nvPr/>
+        </p:nvSpPr>
+        <p:spPr>
+          <a:xfrm>
+            <a:off x="4427984" y="1992117"/>
+            <a:ext cx="3672408" cy="504056"/>
+          </a:xfrm>
+          <a:prstGeom prst="flowChartProcess">
+            <a:avLst/>
+          </a:prstGeom>
+          <a:noFill/>
+        </p:spPr>
+        <p:style>
+          <a:lnRef idx="2">
+            <a:schemeClr val="accent1">
+              <a:shade val="50000"/>
+            </a:schemeClr>
+          </a:lnRef>
+          <a:fillRef idx="1">
+            <a:schemeClr val="accent1"/>
+          </a:fillRef>
+          <a:effectRef idx="0">
+            <a:schemeClr val="accent1"/>
+          </a:effectRef>
+          <a:fontRef idx="minor">
+            <a:schemeClr val="lt1"/>
+          </a:fontRef>
+        </p:style>
+        <p:txBody>
+          <a:bodyPr rtlCol="0" anchor="ctr"/>
+          <a:lstStyle/>
+          <a:p>
+            <a:pPr algn="ctr"/>
+            <a:r>
+              <a:rPr lang="nl-NL" dirty="0" err="1" smtClean="0">
+                <a:solidFill>
+                  <a:schemeClr val="tx1"/>
+                </a:solidFill>
+              </a:rPr>
+              <a:t>Deduplicate</a:t>
+            </a:r>
+            <a:r>
+              <a:rPr lang="nl-NL" dirty="0" smtClean="0">
+                <a:solidFill>
+                  <a:schemeClr val="tx1"/>
+                </a:solidFill>
+              </a:rPr>
+              <a:t> </a:t>
+            </a:r>
+            <a:r>
+              <a:rPr lang="nl-NL" dirty="0" err="1" smtClean="0">
+                <a:solidFill>
+                  <a:schemeClr val="tx1"/>
+                </a:solidFill>
+              </a:rPr>
+              <a:t>rows</a:t>
+            </a:r>
+            <a:endParaRPr lang="nl-NL" dirty="0">
+              <a:solidFill>
+                <a:schemeClr val="tx1"/>
+              </a:solidFill>
+            </a:endParaRPr>
+          </a:p>
+        </p:txBody>
+      </p:sp>
+      <p:sp>
+        <p:nvSpPr>
+          <p:cNvPr id="9" name="Flowchart: Process 8"/>
+          <p:cNvSpPr/>
+          <p:nvPr/>
+        </p:nvSpPr>
+        <p:spPr>
+          <a:xfrm>
+            <a:off x="4427984" y="3717032"/>
+            <a:ext cx="1836204" cy="504056"/>
+          </a:xfrm>
+          <a:prstGeom prst="flowChartProcess">
+            <a:avLst/>
+          </a:prstGeom>
+          <a:noFill/>
+        </p:spPr>
+        <p:style>
+          <a:lnRef idx="2">
+            <a:schemeClr val="accent1">
+              <a:shade val="50000"/>
+            </a:schemeClr>
+          </a:lnRef>
+          <a:fillRef idx="1">
+            <a:schemeClr val="accent1"/>
+          </a:fillRef>
+          <a:effectRef idx="0">
+            <a:schemeClr val="accent1"/>
+          </a:effectRef>
+          <a:fontRef idx="minor">
+            <a:schemeClr val="lt1"/>
+          </a:fontRef>
+        </p:style>
+        <p:txBody>
+          <a:bodyPr rtlCol="0" anchor="ctr"/>
+          <a:lstStyle/>
+          <a:p>
+            <a:pPr algn="ctr"/>
+            <a:r>
+              <a:rPr lang="nl-NL" dirty="0" smtClean="0">
+                <a:solidFill>
+                  <a:schemeClr val="tx1"/>
+                </a:solidFill>
+              </a:rPr>
+              <a:t>Group records</a:t>
+            </a:r>
+            <a:endParaRPr lang="nl-NL" dirty="0">
+              <a:solidFill>
+                <a:schemeClr val="tx1"/>
+              </a:solidFill>
+            </a:endParaRPr>
+          </a:p>
+        </p:txBody>
+      </p:sp>
+      <p:sp>
+        <p:nvSpPr>
+          <p:cNvPr id="10" name="Flowchart: Direct Access Storage 9"/>
+          <p:cNvSpPr/>
+          <p:nvPr/>
+        </p:nvSpPr>
+        <p:spPr>
+          <a:xfrm flipH="1">
+            <a:off x="2555776" y="1916832"/>
+            <a:ext cx="1512168" cy="654626"/>
+          </a:xfrm>
+          <a:prstGeom prst="flowChartMagneticDrum">
+            <a:avLst/>
+          </a:prstGeom>
+          <a:noFill/>
+        </p:spPr>
+        <p:style>
+          <a:lnRef idx="2">
+            <a:schemeClr val="accent1">
+              <a:shade val="50000"/>
+            </a:schemeClr>
+          </a:lnRef>
+          <a:fillRef idx="1">
+            <a:schemeClr val="accent1"/>
+          </a:fillRef>
+          <a:effectRef idx="0">
+            <a:schemeClr val="accent1"/>
+          </a:effectRef>
+          <a:fontRef idx="minor">
+            <a:schemeClr val="lt1"/>
+          </a:fontRef>
+        </p:style>
+        <p:txBody>
+          <a:bodyPr rtlCol="0" anchor="ctr"/>
+          <a:lstStyle/>
+          <a:p>
+            <a:pPr algn="ctr"/>
+            <a:r>
+              <a:rPr lang="nl-NL" dirty="0" err="1">
+                <a:solidFill>
+                  <a:schemeClr val="tx1"/>
+                </a:solidFill>
+              </a:rPr>
+              <a:t>Kafka</a:t>
+            </a:r>
+            <a:r>
+              <a:rPr lang="nl-NL" dirty="0">
+                <a:solidFill>
+                  <a:schemeClr val="tx1"/>
+                </a:solidFill>
+              </a:rPr>
+              <a:t> topic</a:t>
+            </a:r>
+          </a:p>
+        </p:txBody>
+      </p:sp>
+      <p:cxnSp>
+        <p:nvCxnSpPr>
+          <p:cNvPr id="11" name="Straight Connector 10"/>
+          <p:cNvCxnSpPr>
+            <a:stCxn id="4" idx="3"/>
+            <a:endCxn id="10" idx="4"/>
+          </p:cNvCxnSpPr>
+          <p:nvPr/>
+        </p:nvCxnSpPr>
+        <p:spPr>
+          <a:xfrm>
+            <a:off x="2195736" y="1880828"/>
+            <a:ext cx="360040" cy="363317"/>
+          </a:xfrm>
+          <a:prstGeom prst="line">
+            <a:avLst/>
+          </a:prstGeom>
+          <a:ln w="12700">
+            <a:solidFill>
+              <a:schemeClr val="tx2"/>
+            </a:solidFill>
+          </a:ln>
+        </p:spPr>
+        <p:style>
+          <a:lnRef idx="1">
+            <a:schemeClr val="accent1"/>
+          </a:lnRef>
+          <a:fillRef idx="0">
+            <a:schemeClr val="accent1"/>
+          </a:fillRef>
+          <a:effectRef idx="0">
+            <a:schemeClr val="accent1"/>
+          </a:effectRef>
+          <a:fontRef idx="minor">
+            <a:schemeClr val="tx1"/>
+          </a:fontRef>
+        </p:style>
+      </p:cxnSp>
+      <p:cxnSp>
+        <p:nvCxnSpPr>
+          <p:cNvPr id="14" name="Straight Connector 13"/>
+          <p:cNvCxnSpPr>
+            <a:stCxn id="6" idx="3"/>
+            <a:endCxn id="10" idx="4"/>
+          </p:cNvCxnSpPr>
+          <p:nvPr/>
+        </p:nvCxnSpPr>
+        <p:spPr>
+          <a:xfrm flipV="1">
+            <a:off x="2195736" y="2244145"/>
+            <a:ext cx="360040" cy="428771"/>
+          </a:xfrm>
+          <a:prstGeom prst="line">
+            <a:avLst/>
+          </a:prstGeom>
+          <a:ln w="12700">
+            <a:solidFill>
+              <a:schemeClr val="tx2"/>
+            </a:solidFill>
+          </a:ln>
+        </p:spPr>
+        <p:style>
+          <a:lnRef idx="1">
+            <a:schemeClr val="accent1"/>
+          </a:lnRef>
+          <a:fillRef idx="0">
+            <a:schemeClr val="accent1"/>
+          </a:fillRef>
+          <a:effectRef idx="0">
+            <a:schemeClr val="accent1"/>
+          </a:effectRef>
+          <a:fontRef idx="minor">
+            <a:schemeClr val="tx1"/>
+          </a:fontRef>
+        </p:style>
+      </p:cxnSp>
+      <p:cxnSp>
+        <p:nvCxnSpPr>
+          <p:cNvPr id="17" name="Straight Connector 16"/>
+          <p:cNvCxnSpPr>
+            <a:stCxn id="10" idx="1"/>
+            <a:endCxn id="8" idx="1"/>
+          </p:cNvCxnSpPr>
+          <p:nvPr/>
+        </p:nvCxnSpPr>
+        <p:spPr>
+          <a:xfrm>
+            <a:off x="4067944" y="2244145"/>
+            <a:ext cx="360040" cy="0"/>
+          </a:xfrm>
+          <a:prstGeom prst="line">
+            <a:avLst/>
+          </a:prstGeom>
+          <a:ln w="12700">
+            <a:solidFill>
+              <a:schemeClr val="tx2"/>
+            </a:solidFill>
+          </a:ln>
+        </p:spPr>
+        <p:style>
+          <a:lnRef idx="1">
+            <a:schemeClr val="accent1"/>
+          </a:lnRef>
+          <a:fillRef idx="0">
+            <a:schemeClr val="accent1"/>
+          </a:fillRef>
+          <a:effectRef idx="0">
+            <a:schemeClr val="accent1"/>
+          </a:effectRef>
+          <a:fontRef idx="minor">
+            <a:schemeClr val="tx1"/>
+          </a:fontRef>
+        </p:style>
+      </p:cxnSp>
+      <p:cxnSp>
+        <p:nvCxnSpPr>
+          <p:cNvPr id="20" name="Straight Connector 19"/>
+          <p:cNvCxnSpPr>
+            <a:stCxn id="8" idx="2"/>
+            <a:endCxn id="7" idx="0"/>
+          </p:cNvCxnSpPr>
+          <p:nvPr/>
+        </p:nvCxnSpPr>
+        <p:spPr>
+          <a:xfrm>
+            <a:off x="6264188" y="2496173"/>
+            <a:ext cx="0" cy="356763"/>
+          </a:xfrm>
+          <a:prstGeom prst="line">
+            <a:avLst/>
+          </a:prstGeom>
+          <a:ln w="12700">
+            <a:solidFill>
+              <a:schemeClr val="tx2"/>
+            </a:solidFill>
+          </a:ln>
+        </p:spPr>
+        <p:style>
+          <a:lnRef idx="1">
+            <a:schemeClr val="accent1"/>
+          </a:lnRef>
+          <a:fillRef idx="0">
+            <a:schemeClr val="accent1"/>
+          </a:fillRef>
+          <a:effectRef idx="0">
+            <a:schemeClr val="accent1"/>
+          </a:effectRef>
+          <a:fontRef idx="minor">
+            <a:schemeClr val="tx1"/>
+          </a:fontRef>
+        </p:style>
+      </p:cxnSp>
+      <p:cxnSp>
+        <p:nvCxnSpPr>
+          <p:cNvPr id="23" name="Straight Connector 22"/>
+          <p:cNvCxnSpPr/>
+          <p:nvPr/>
+        </p:nvCxnSpPr>
+        <p:spPr>
+          <a:xfrm>
+            <a:off x="5382090" y="3356992"/>
+            <a:ext cx="0" cy="360040"/>
+          </a:xfrm>
+          <a:prstGeom prst="line">
+            <a:avLst/>
+          </a:prstGeom>
+          <a:ln w="12700">
+            <a:solidFill>
+              <a:schemeClr val="tx2"/>
+            </a:solidFill>
+          </a:ln>
+        </p:spPr>
+        <p:style>
+          <a:lnRef idx="1">
+            <a:schemeClr val="accent1"/>
+          </a:lnRef>
+          <a:fillRef idx="0">
+            <a:schemeClr val="accent1"/>
+          </a:fillRef>
+          <a:effectRef idx="0">
+            <a:schemeClr val="accent1"/>
+          </a:effectRef>
+          <a:fontRef idx="minor">
+            <a:schemeClr val="tx1"/>
+          </a:fontRef>
+        </p:style>
+      </p:cxnSp>
+      <p:sp>
+        <p:nvSpPr>
+          <p:cNvPr id="28" name="Flowchart: Process 27"/>
+          <p:cNvSpPr/>
+          <p:nvPr/>
+        </p:nvSpPr>
+        <p:spPr>
+          <a:xfrm>
+            <a:off x="4427984" y="4581128"/>
+            <a:ext cx="1836204" cy="504056"/>
+          </a:xfrm>
+          <a:prstGeom prst="flowChartProcess">
+            <a:avLst/>
+          </a:prstGeom>
+          <a:noFill/>
+        </p:spPr>
+        <p:style>
+          <a:lnRef idx="2">
+            <a:schemeClr val="accent1">
+              <a:shade val="50000"/>
+            </a:schemeClr>
+          </a:lnRef>
+          <a:fillRef idx="1">
+            <a:schemeClr val="accent1"/>
+          </a:fillRef>
+          <a:effectRef idx="0">
+            <a:schemeClr val="accent1"/>
+          </a:effectRef>
+          <a:fontRef idx="minor">
+            <a:schemeClr val="lt1"/>
+          </a:fontRef>
+        </p:style>
+        <p:txBody>
+          <a:bodyPr rtlCol="0" anchor="ctr"/>
+          <a:lstStyle/>
+          <a:p>
+            <a:pPr algn="ctr"/>
+            <a:r>
+              <a:rPr lang="nl-NL" dirty="0" smtClean="0">
+                <a:solidFill>
+                  <a:schemeClr val="tx1"/>
+                </a:solidFill>
+              </a:rPr>
+              <a:t>Evaluation</a:t>
+            </a:r>
+            <a:endParaRPr lang="nl-NL" dirty="0">
+              <a:solidFill>
+                <a:schemeClr val="tx1"/>
+              </a:solidFill>
+            </a:endParaRPr>
+          </a:p>
+        </p:txBody>
+      </p:sp>
+      <p:cxnSp>
+        <p:nvCxnSpPr>
+          <p:cNvPr id="30" name="Straight Connector 29"/>
+          <p:cNvCxnSpPr/>
+          <p:nvPr/>
+        </p:nvCxnSpPr>
+        <p:spPr>
+          <a:xfrm>
+            <a:off x="5382090" y="4221088"/>
+            <a:ext cx="0" cy="360040"/>
+          </a:xfrm>
+          <a:prstGeom prst="line">
+            <a:avLst/>
+          </a:prstGeom>
+          <a:ln w="12700">
+            <a:solidFill>
+              <a:schemeClr val="tx2"/>
+            </a:solidFill>
+          </a:ln>
+        </p:spPr>
+        <p:style>
+          <a:lnRef idx="1">
+            <a:schemeClr val="accent1"/>
+          </a:lnRef>
+          <a:fillRef idx="0">
+            <a:schemeClr val="accent1"/>
+          </a:fillRef>
+          <a:effectRef idx="0">
+            <a:schemeClr val="accent1"/>
+          </a:effectRef>
+          <a:fontRef idx="minor">
+            <a:schemeClr val="tx1"/>
+          </a:fontRef>
+        </p:style>
+      </p:cxnSp>
+      <p:sp>
+        <p:nvSpPr>
+          <p:cNvPr id="31" name="Flowchart: Process 30"/>
+          <p:cNvSpPr/>
+          <p:nvPr/>
+        </p:nvSpPr>
+        <p:spPr>
+          <a:xfrm>
+            <a:off x="6444208" y="3717032"/>
+            <a:ext cx="1656184" cy="504056"/>
+          </a:xfrm>
+          <a:prstGeom prst="flowChartProcess">
+            <a:avLst/>
+          </a:prstGeom>
+          <a:noFill/>
+        </p:spPr>
+        <p:style>
+          <a:lnRef idx="2">
+            <a:schemeClr val="accent1">
+              <a:shade val="50000"/>
+            </a:schemeClr>
+          </a:lnRef>
+          <a:fillRef idx="1">
+            <a:schemeClr val="accent1"/>
+          </a:fillRef>
+          <a:effectRef idx="0">
+            <a:schemeClr val="accent1"/>
+          </a:effectRef>
+          <a:fontRef idx="minor">
+            <a:schemeClr val="lt1"/>
+          </a:fontRef>
+        </p:style>
+        <p:txBody>
+          <a:bodyPr rtlCol="0" anchor="ctr"/>
+          <a:lstStyle/>
+          <a:p>
+            <a:pPr algn="ctr"/>
+            <a:r>
+              <a:rPr lang="nl-NL" dirty="0" err="1" smtClean="0">
+                <a:solidFill>
+                  <a:schemeClr val="tx1"/>
+                </a:solidFill>
+              </a:rPr>
+              <a:t>Realtime</a:t>
+            </a:r>
+            <a:r>
+              <a:rPr lang="nl-NL" dirty="0" smtClean="0">
+                <a:solidFill>
+                  <a:schemeClr val="tx1"/>
+                </a:solidFill>
+              </a:rPr>
+              <a:t> feed</a:t>
+            </a:r>
+            <a:endParaRPr lang="nl-NL" dirty="0">
+              <a:solidFill>
+                <a:schemeClr val="tx1"/>
+              </a:solidFill>
+            </a:endParaRPr>
+          </a:p>
+        </p:txBody>
+      </p:sp>
+      <p:cxnSp>
+        <p:nvCxnSpPr>
+          <p:cNvPr id="32" name="Straight Connector 31"/>
+          <p:cNvCxnSpPr/>
+          <p:nvPr/>
+        </p:nvCxnSpPr>
+        <p:spPr>
+          <a:xfrm>
+            <a:off x="7236296" y="3356992"/>
+            <a:ext cx="0" cy="360040"/>
+          </a:xfrm>
+          <a:prstGeom prst="line">
+            <a:avLst/>
+          </a:prstGeom>
+          <a:ln w="12700">
+            <a:solidFill>
+              <a:schemeClr val="tx2"/>
+            </a:solidFill>
+          </a:ln>
+        </p:spPr>
+        <p:style>
+          <a:lnRef idx="1">
+            <a:schemeClr val="accent1"/>
+          </a:lnRef>
+          <a:fillRef idx="0">
+            <a:schemeClr val="accent1"/>
+          </a:fillRef>
+          <a:effectRef idx="0">
+            <a:schemeClr val="accent1"/>
+          </a:effectRef>
+          <a:fontRef idx="minor">
+            <a:schemeClr val="tx1"/>
+          </a:fontRef>
+        </p:style>
+      </p:cxnSp>
+      <p:sp>
+        <p:nvSpPr>
+          <p:cNvPr id="33" name="Flowchart: Process 32"/>
+          <p:cNvSpPr/>
+          <p:nvPr/>
+        </p:nvSpPr>
+        <p:spPr>
+          <a:xfrm>
+            <a:off x="6444208" y="4581128"/>
+            <a:ext cx="1656184" cy="504056"/>
+          </a:xfrm>
+          <a:prstGeom prst="flowChartProcess">
+            <a:avLst/>
+          </a:prstGeom>
+          <a:noFill/>
+        </p:spPr>
+        <p:style>
+          <a:lnRef idx="2">
+            <a:schemeClr val="accent1">
+              <a:shade val="50000"/>
+            </a:schemeClr>
+          </a:lnRef>
+          <a:fillRef idx="1">
+            <a:schemeClr val="accent1"/>
+          </a:fillRef>
+          <a:effectRef idx="0">
+            <a:schemeClr val="accent1"/>
+          </a:effectRef>
+          <a:fontRef idx="minor">
+            <a:schemeClr val="lt1"/>
+          </a:fontRef>
+        </p:style>
+        <p:txBody>
+          <a:bodyPr rtlCol="0" anchor="ctr"/>
+          <a:lstStyle/>
+          <a:p>
+            <a:pPr algn="ctr"/>
+            <a:r>
+              <a:rPr lang="nl-NL" dirty="0" smtClean="0">
+                <a:solidFill>
+                  <a:schemeClr val="tx1"/>
+                </a:solidFill>
+              </a:rPr>
+              <a:t>Live map/API</a:t>
+            </a:r>
+            <a:endParaRPr lang="nl-NL" dirty="0">
+              <a:solidFill>
+                <a:schemeClr val="tx1"/>
+              </a:solidFill>
+            </a:endParaRPr>
+          </a:p>
+        </p:txBody>
+      </p:sp>
+      <p:cxnSp>
+        <p:nvCxnSpPr>
+          <p:cNvPr id="34" name="Straight Connector 33"/>
+          <p:cNvCxnSpPr/>
+          <p:nvPr/>
+        </p:nvCxnSpPr>
+        <p:spPr>
+          <a:xfrm>
+            <a:off x="7236296" y="4221088"/>
+            <a:ext cx="0" cy="360040"/>
+          </a:xfrm>
+          <a:prstGeom prst="line">
+            <a:avLst/>
+          </a:prstGeom>
+          <a:ln w="12700">
+            <a:solidFill>
+              <a:schemeClr val="tx2"/>
+            </a:solidFill>
+          </a:ln>
+        </p:spPr>
+        <p:style>
+          <a:lnRef idx="1">
+            <a:schemeClr val="accent1"/>
+          </a:lnRef>
+          <a:fillRef idx="0">
+            <a:schemeClr val="accent1"/>
+          </a:fillRef>
+          <a:effectRef idx="0">
+            <a:schemeClr val="accent1"/>
+          </a:effectRef>
+          <a:fontRef idx="minor">
+            <a:schemeClr val="tx1"/>
+          </a:fontRef>
+        </p:style>
+      </p:cxnSp>
+      <p:sp>
+        <p:nvSpPr>
+          <p:cNvPr id="35" name="Flowchart: Process 34"/>
+          <p:cNvSpPr/>
+          <p:nvPr/>
+        </p:nvSpPr>
+        <p:spPr>
+          <a:xfrm>
+            <a:off x="4427984" y="5445224"/>
+            <a:ext cx="1836204" cy="504056"/>
+          </a:xfrm>
+          <a:prstGeom prst="flowChartProcess">
+            <a:avLst/>
+          </a:prstGeom>
+          <a:noFill/>
+        </p:spPr>
+        <p:style>
+          <a:lnRef idx="2">
+            <a:schemeClr val="accent1">
+              <a:shade val="50000"/>
+            </a:schemeClr>
+          </a:lnRef>
+          <a:fillRef idx="1">
+            <a:schemeClr val="accent1"/>
+          </a:fillRef>
+          <a:effectRef idx="0">
+            <a:schemeClr val="accent1"/>
+          </a:effectRef>
+          <a:fontRef idx="minor">
+            <a:schemeClr val="lt1"/>
+          </a:fontRef>
+        </p:style>
+        <p:txBody>
+          <a:bodyPr rtlCol="0" anchor="ctr"/>
+          <a:lstStyle/>
+          <a:p>
+            <a:pPr algn="ctr"/>
+            <a:r>
+              <a:rPr lang="nl-NL" dirty="0" err="1" smtClean="0">
+                <a:solidFill>
+                  <a:schemeClr val="tx1"/>
+                </a:solidFill>
+              </a:rPr>
+              <a:t>Reports</a:t>
+            </a:r>
+            <a:r>
+              <a:rPr lang="nl-NL" dirty="0" smtClean="0">
+                <a:solidFill>
+                  <a:schemeClr val="tx1"/>
+                </a:solidFill>
+              </a:rPr>
+              <a:t>/</a:t>
+            </a:r>
+            <a:r>
+              <a:rPr lang="nl-NL" dirty="0" err="1" smtClean="0">
+                <a:solidFill>
+                  <a:schemeClr val="tx1"/>
+                </a:solidFill>
+              </a:rPr>
+              <a:t>History</a:t>
+            </a:r>
+            <a:endParaRPr lang="nl-NL" dirty="0">
+              <a:solidFill>
+                <a:schemeClr val="tx1"/>
+              </a:solidFill>
+            </a:endParaRPr>
+          </a:p>
+        </p:txBody>
+      </p:sp>
+      <p:cxnSp>
+        <p:nvCxnSpPr>
+          <p:cNvPr id="36" name="Straight Connector 35"/>
+          <p:cNvCxnSpPr/>
+          <p:nvPr/>
+        </p:nvCxnSpPr>
+        <p:spPr>
+          <a:xfrm>
+            <a:off x="5364088" y="5085184"/>
+            <a:ext cx="0" cy="360040"/>
+          </a:xfrm>
+          <a:prstGeom prst="line">
+            <a:avLst/>
+          </a:prstGeom>
+          <a:ln w="12700">
+            <a:solidFill>
+              <a:schemeClr val="tx2"/>
+            </a:solidFill>
+          </a:ln>
+        </p:spPr>
+        <p:style>
+          <a:lnRef idx="1">
+            <a:schemeClr val="accent1"/>
+          </a:lnRef>
+          <a:fillRef idx="0">
+            <a:schemeClr val="accent1"/>
+          </a:fillRef>
+          <a:effectRef idx="0">
+            <a:schemeClr val="accent1"/>
+          </a:effectRef>
+          <a:fontRef idx="minor">
+            <a:schemeClr val="tx1"/>
+          </a:fontRef>
+        </p:style>
+      </p:cxnSp>
+    </p:spTree>
+    <p:extLst>
+      <p:ext uri="{BB962C8B-B14F-4D97-AF65-F5344CB8AC3E}">
+        <p14:creationId xmlns:p14="http://schemas.microsoft.com/office/powerpoint/2010/main" val="228003654"/>
+      </p:ext>
+    </p:extLst>
+  </p:cSld>
+  <p:clrMapOvr>
+    <a:masterClrMapping/>
+  </p:clrMapOvr>
+</p:sld>
+</file>
+
+<file path=ppt/slides/slide6.xml><?xml version="1.0" encoding="utf-8"?>
+<p:sld xmlns:a="http://schemas.openxmlformats.org/drawingml/2006/main" xmlns:r="http://schemas.openxmlformats.org/officeDocument/2006/relationships" xmlns:p="http://schemas.openxmlformats.org/presentationml/2006/main">
+  <p:cSld>
+    <p:spTree>
+      <p:nvGrpSpPr>
+        <p:cNvPr id="1" name=""/>
+        <p:cNvGrpSpPr/>
+        <p:nvPr/>
+      </p:nvGrpSpPr>
+      <p:grpSpPr>
+        <a:xfrm>
+          <a:off x="0" y="0"/>
+          <a:ext cx="0" cy="0"/>
+          <a:chOff x="0" y="0"/>
+          <a:chExt cx="0" cy="0"/>
+        </a:xfrm>
+      </p:grpSpPr>
+      <p:sp>
+        <p:nvSpPr>
+          <p:cNvPr id="2" name="Title 1"/>
+          <p:cNvSpPr>
+            <a:spLocks noGrp="1"/>
+          </p:cNvSpPr>
+          <p:nvPr>
+            <p:ph type="title"/>
+          </p:nvPr>
+        </p:nvSpPr>
+        <p:spPr/>
+        <p:txBody>
+          <a:bodyPr/>
+          <a:lstStyle/>
+          <a:p>
+            <a:r>
+              <a:rPr lang="nl-NL" dirty="0" smtClean="0"/>
+              <a:t>Architecture (</a:t>
+            </a:r>
+            <a:r>
+              <a:rPr lang="nl-NL" dirty="0" err="1" smtClean="0"/>
+              <a:t>logical</a:t>
+            </a:r>
+            <a:r>
+              <a:rPr lang="nl-NL" dirty="0" smtClean="0"/>
+              <a:t>)</a:t>
+            </a:r>
+            <a:endParaRPr lang="nl-NL" dirty="0"/>
+          </a:p>
+        </p:txBody>
+      </p:sp>
+      <p:sp>
+        <p:nvSpPr>
+          <p:cNvPr id="4" name="Flowchart: Process 3"/>
+          <p:cNvSpPr/>
+          <p:nvPr/>
+        </p:nvSpPr>
+        <p:spPr>
+          <a:xfrm>
+            <a:off x="1259632" y="1628800"/>
+            <a:ext cx="1800200" cy="1296144"/>
+          </a:xfrm>
+          <a:prstGeom prst="flowChartProcess">
+            <a:avLst/>
+          </a:prstGeom>
+          <a:noFill/>
+          <a:ln>
+            <a:prstDash val="dashDot"/>
+          </a:ln>
+        </p:spPr>
+        <p:style>
+          <a:lnRef idx="2">
+            <a:schemeClr val="accent1">
+              <a:shade val="50000"/>
+            </a:schemeClr>
+          </a:lnRef>
+          <a:fillRef idx="1">
+            <a:schemeClr val="accent1"/>
+          </a:fillRef>
+          <a:effectRef idx="0">
+            <a:schemeClr val="accent1"/>
+          </a:effectRef>
+          <a:fontRef idx="minor">
+            <a:schemeClr val="lt1"/>
+          </a:fontRef>
+        </p:style>
+        <p:txBody>
+          <a:bodyPr rtlCol="0" anchor="ctr"/>
+          <a:lstStyle/>
+          <a:p>
+            <a:pPr algn="ctr"/>
+            <a:endParaRPr lang="nl-NL" dirty="0">
+              <a:solidFill>
+                <a:schemeClr val="tx1"/>
+              </a:solidFill>
+            </a:endParaRPr>
+          </a:p>
+        </p:txBody>
+      </p:sp>
+      <p:sp>
+        <p:nvSpPr>
+          <p:cNvPr id="8" name="Flowchart: Process 7"/>
+          <p:cNvSpPr/>
+          <p:nvPr/>
+        </p:nvSpPr>
+        <p:spPr>
+          <a:xfrm>
+            <a:off x="1403648" y="1772816"/>
+            <a:ext cx="1512168" cy="504056"/>
+          </a:xfrm>
+          <a:prstGeom prst="flowChartProcess">
+            <a:avLst/>
+          </a:prstGeom>
+          <a:noFill/>
+        </p:spPr>
+        <p:style>
+          <a:lnRef idx="2">
+            <a:schemeClr val="accent1">
+              <a:shade val="50000"/>
+            </a:schemeClr>
+          </a:lnRef>
+          <a:fillRef idx="1">
+            <a:schemeClr val="accent1"/>
+          </a:fillRef>
+          <a:effectRef idx="0">
+            <a:schemeClr val="accent1"/>
+          </a:effectRef>
+          <a:fontRef idx="minor">
+            <a:schemeClr val="lt1"/>
+          </a:fontRef>
+        </p:style>
+        <p:txBody>
+          <a:bodyPr rtlCol="0" anchor="ctr"/>
+          <a:lstStyle/>
+          <a:p>
+            <a:pPr algn="ctr"/>
+            <a:r>
+              <a:rPr lang="nl-NL" dirty="0" smtClean="0">
+                <a:solidFill>
+                  <a:schemeClr val="tx1"/>
+                </a:solidFill>
+              </a:rPr>
+              <a:t>dump1090</a:t>
+            </a:r>
+            <a:endParaRPr lang="nl-NL" dirty="0">
+              <a:solidFill>
+                <a:schemeClr val="tx1"/>
+              </a:solidFill>
+            </a:endParaRPr>
+          </a:p>
+        </p:txBody>
+      </p:sp>
+      <p:sp>
+        <p:nvSpPr>
+          <p:cNvPr id="9" name="Flowchart: Process 8"/>
+          <p:cNvSpPr/>
+          <p:nvPr/>
+        </p:nvSpPr>
+        <p:spPr>
+          <a:xfrm>
+            <a:off x="1403648" y="2276872"/>
+            <a:ext cx="1512168" cy="504056"/>
+          </a:xfrm>
+          <a:prstGeom prst="flowChartProcess">
+            <a:avLst/>
+          </a:prstGeom>
+          <a:noFill/>
+        </p:spPr>
+        <p:style>
+          <a:lnRef idx="2">
+            <a:schemeClr val="accent1">
+              <a:shade val="50000"/>
+            </a:schemeClr>
+          </a:lnRef>
+          <a:fillRef idx="1">
+            <a:schemeClr val="accent1"/>
+          </a:fillRef>
+          <a:effectRef idx="0">
+            <a:schemeClr val="accent1"/>
+          </a:effectRef>
+          <a:fontRef idx="minor">
+            <a:schemeClr val="lt1"/>
+          </a:fontRef>
+        </p:style>
+        <p:txBody>
+          <a:bodyPr rtlCol="0" anchor="ctr"/>
+          <a:lstStyle/>
+          <a:p>
+            <a:pPr algn="ctr"/>
+            <a:r>
+              <a:rPr lang="nl-NL" sz="1600" dirty="0" err="1" smtClean="0">
+                <a:solidFill>
+                  <a:schemeClr val="tx1"/>
+                </a:solidFill>
+              </a:rPr>
+              <a:t>Kafka</a:t>
+            </a:r>
+            <a:r>
+              <a:rPr lang="nl-NL" sz="1600" dirty="0" smtClean="0">
+                <a:solidFill>
+                  <a:schemeClr val="tx1"/>
+                </a:solidFill>
+              </a:rPr>
+              <a:t> producer</a:t>
+            </a:r>
+            <a:endParaRPr lang="nl-NL" sz="1600" dirty="0">
+              <a:solidFill>
+                <a:schemeClr val="tx1"/>
+              </a:solidFill>
+            </a:endParaRPr>
+          </a:p>
+        </p:txBody>
+      </p:sp>
+      <p:cxnSp>
+        <p:nvCxnSpPr>
+          <p:cNvPr id="11" name="Straight Connector 10"/>
+          <p:cNvCxnSpPr>
+            <a:stCxn id="8" idx="1"/>
+          </p:cNvCxnSpPr>
+          <p:nvPr/>
+        </p:nvCxnSpPr>
+        <p:spPr>
+          <a:xfrm flipH="1">
+            <a:off x="539552" y="2024844"/>
+            <a:ext cx="864096" cy="0"/>
+          </a:xfrm>
+          <a:prstGeom prst="line">
+            <a:avLst/>
+          </a:prstGeom>
+          <a:noFill/>
+        </p:spPr>
+        <p:style>
+          <a:lnRef idx="2">
+            <a:schemeClr val="accent1">
+              <a:shade val="50000"/>
+            </a:schemeClr>
+          </a:lnRef>
+          <a:fillRef idx="1">
+            <a:schemeClr val="accent1"/>
+          </a:fillRef>
+          <a:effectRef idx="0">
+            <a:schemeClr val="accent1"/>
+          </a:effectRef>
+          <a:fontRef idx="minor">
+            <a:schemeClr val="lt1"/>
+          </a:fontRef>
+        </p:style>
+      </p:cxnSp>
+      <p:cxnSp>
+        <p:nvCxnSpPr>
+          <p:cNvPr id="12" name="Straight Connector 11"/>
+          <p:cNvCxnSpPr/>
+          <p:nvPr/>
+        </p:nvCxnSpPr>
+        <p:spPr>
+          <a:xfrm>
+            <a:off x="539552" y="1374635"/>
+            <a:ext cx="0" cy="648072"/>
+          </a:xfrm>
+          <a:prstGeom prst="line">
+            <a:avLst/>
+          </a:prstGeom>
+          <a:noFill/>
+        </p:spPr>
+        <p:style>
+          <a:lnRef idx="2">
+            <a:schemeClr val="accent1">
+              <a:shade val="50000"/>
+            </a:schemeClr>
+          </a:lnRef>
+          <a:fillRef idx="1">
+            <a:schemeClr val="accent1"/>
+          </a:fillRef>
+          <a:effectRef idx="0">
+            <a:schemeClr val="accent1"/>
+          </a:effectRef>
+          <a:fontRef idx="minor">
+            <a:schemeClr val="lt1"/>
+          </a:fontRef>
+        </p:style>
+      </p:cxnSp>
+      <p:cxnSp>
+        <p:nvCxnSpPr>
+          <p:cNvPr id="15" name="Straight Connector 14"/>
+          <p:cNvCxnSpPr/>
+          <p:nvPr/>
+        </p:nvCxnSpPr>
+        <p:spPr>
+          <a:xfrm flipH="1">
+            <a:off x="539552" y="1374635"/>
+            <a:ext cx="152400" cy="144016"/>
+          </a:xfrm>
+          <a:prstGeom prst="line">
+            <a:avLst/>
+          </a:prstGeom>
+          <a:noFill/>
+        </p:spPr>
+        <p:style>
+          <a:lnRef idx="2">
+            <a:schemeClr val="accent1">
+              <a:shade val="50000"/>
+            </a:schemeClr>
+          </a:lnRef>
+          <a:fillRef idx="1">
+            <a:schemeClr val="accent1"/>
+          </a:fillRef>
+          <a:effectRef idx="0">
+            <a:schemeClr val="accent1"/>
+          </a:effectRef>
+          <a:fontRef idx="minor">
+            <a:schemeClr val="lt1"/>
+          </a:fontRef>
+        </p:style>
+      </p:cxnSp>
+      <p:cxnSp>
+        <p:nvCxnSpPr>
+          <p:cNvPr id="19" name="Straight Connector 18"/>
+          <p:cNvCxnSpPr/>
+          <p:nvPr/>
+        </p:nvCxnSpPr>
+        <p:spPr>
+          <a:xfrm>
+            <a:off x="395536" y="1374635"/>
+            <a:ext cx="152400" cy="144016"/>
+          </a:xfrm>
+          <a:prstGeom prst="line">
+            <a:avLst/>
+          </a:prstGeom>
+          <a:noFill/>
+        </p:spPr>
+        <p:style>
+          <a:lnRef idx="2">
+            <a:schemeClr val="accent1">
+              <a:shade val="50000"/>
+            </a:schemeClr>
+          </a:lnRef>
+          <a:fillRef idx="1">
+            <a:schemeClr val="accent1"/>
+          </a:fillRef>
+          <a:effectRef idx="0">
+            <a:schemeClr val="accent1"/>
+          </a:effectRef>
+          <a:fontRef idx="minor">
+            <a:schemeClr val="lt1"/>
+          </a:fontRef>
+        </p:style>
+      </p:cxnSp>
+      <p:sp>
+        <p:nvSpPr>
+          <p:cNvPr id="20" name="Flowchart: Process 19"/>
+          <p:cNvSpPr/>
+          <p:nvPr/>
+        </p:nvSpPr>
+        <p:spPr>
+          <a:xfrm>
+            <a:off x="1259632" y="4149080"/>
+            <a:ext cx="1800200" cy="1296144"/>
+          </a:xfrm>
+          <a:prstGeom prst="flowChartProcess">
+            <a:avLst/>
+          </a:prstGeom>
+          <a:noFill/>
+          <a:ln>
+            <a:prstDash val="dashDot"/>
+          </a:ln>
+        </p:spPr>
+        <p:style>
+          <a:lnRef idx="2">
+            <a:schemeClr val="accent1">
+              <a:shade val="50000"/>
+            </a:schemeClr>
+          </a:lnRef>
+          <a:fillRef idx="1">
+            <a:schemeClr val="accent1"/>
+          </a:fillRef>
+          <a:effectRef idx="0">
+            <a:schemeClr val="accent1"/>
+          </a:effectRef>
+          <a:fontRef idx="minor">
+            <a:schemeClr val="lt1"/>
+          </a:fontRef>
+        </p:style>
+        <p:txBody>
+          <a:bodyPr rtlCol="0" anchor="ctr"/>
+          <a:lstStyle/>
+          <a:p>
+            <a:pPr algn="ctr"/>
+            <a:endParaRPr lang="nl-NL" dirty="0">
+              <a:solidFill>
+                <a:schemeClr val="tx1"/>
+              </a:solidFill>
+            </a:endParaRPr>
+          </a:p>
+        </p:txBody>
+      </p:sp>
+      <p:sp>
+        <p:nvSpPr>
+          <p:cNvPr id="21" name="Flowchart: Process 20"/>
+          <p:cNvSpPr/>
+          <p:nvPr/>
+        </p:nvSpPr>
+        <p:spPr>
+          <a:xfrm>
+            <a:off x="1403648" y="4293096"/>
+            <a:ext cx="1512168" cy="504056"/>
+          </a:xfrm>
+          <a:prstGeom prst="flowChartProcess">
+            <a:avLst/>
+          </a:prstGeom>
+          <a:noFill/>
+        </p:spPr>
+        <p:style>
+          <a:lnRef idx="2">
+            <a:schemeClr val="accent1">
+              <a:shade val="50000"/>
+            </a:schemeClr>
+          </a:lnRef>
+          <a:fillRef idx="1">
+            <a:schemeClr val="accent1"/>
+          </a:fillRef>
+          <a:effectRef idx="0">
+            <a:schemeClr val="accent1"/>
+          </a:effectRef>
+          <a:fontRef idx="minor">
+            <a:schemeClr val="lt1"/>
+          </a:fontRef>
+        </p:style>
+        <p:txBody>
+          <a:bodyPr rtlCol="0" anchor="ctr"/>
+          <a:lstStyle/>
+          <a:p>
+            <a:pPr algn="ctr"/>
+            <a:r>
+              <a:rPr lang="nl-NL" dirty="0" smtClean="0">
+                <a:solidFill>
+                  <a:schemeClr val="tx1"/>
+                </a:solidFill>
+              </a:rPr>
+              <a:t>dump1090</a:t>
+            </a:r>
+            <a:endParaRPr lang="nl-NL" dirty="0">
+              <a:solidFill>
+                <a:schemeClr val="tx1"/>
+              </a:solidFill>
+            </a:endParaRPr>
+          </a:p>
+        </p:txBody>
+      </p:sp>
+      <p:sp>
+        <p:nvSpPr>
+          <p:cNvPr id="22" name="Flowchart: Process 21"/>
+          <p:cNvSpPr/>
+          <p:nvPr/>
+        </p:nvSpPr>
+        <p:spPr>
+          <a:xfrm>
+            <a:off x="1403648" y="4797152"/>
+            <a:ext cx="1512168" cy="504056"/>
+          </a:xfrm>
+          <a:prstGeom prst="flowChartProcess">
+            <a:avLst/>
+          </a:prstGeom>
+          <a:noFill/>
+        </p:spPr>
+        <p:style>
+          <a:lnRef idx="2">
+            <a:schemeClr val="accent1">
+              <a:shade val="50000"/>
+            </a:schemeClr>
+          </a:lnRef>
+          <a:fillRef idx="1">
+            <a:schemeClr val="accent1"/>
+          </a:fillRef>
+          <a:effectRef idx="0">
+            <a:schemeClr val="accent1"/>
+          </a:effectRef>
+          <a:fontRef idx="minor">
+            <a:schemeClr val="lt1"/>
+          </a:fontRef>
+        </p:style>
+        <p:txBody>
+          <a:bodyPr rtlCol="0" anchor="ctr"/>
+          <a:lstStyle/>
+          <a:p>
+            <a:pPr algn="ctr"/>
+            <a:r>
+              <a:rPr lang="nl-NL" sz="1600" dirty="0" err="1" smtClean="0">
+                <a:solidFill>
+                  <a:schemeClr val="tx1"/>
+                </a:solidFill>
+              </a:rPr>
+              <a:t>Kafka</a:t>
+            </a:r>
+            <a:r>
+              <a:rPr lang="nl-NL" sz="1600" dirty="0" smtClean="0">
+                <a:solidFill>
+                  <a:schemeClr val="tx1"/>
+                </a:solidFill>
+              </a:rPr>
+              <a:t> producer</a:t>
+            </a:r>
+            <a:endParaRPr lang="nl-NL" sz="1600" dirty="0">
+              <a:solidFill>
+                <a:schemeClr val="tx1"/>
+              </a:solidFill>
+            </a:endParaRPr>
+          </a:p>
+        </p:txBody>
+      </p:sp>
+      <p:cxnSp>
+        <p:nvCxnSpPr>
+          <p:cNvPr id="29" name="Straight Connector 28"/>
+          <p:cNvCxnSpPr/>
+          <p:nvPr/>
+        </p:nvCxnSpPr>
+        <p:spPr>
+          <a:xfrm flipH="1">
+            <a:off x="539552" y="4581128"/>
+            <a:ext cx="864096" cy="0"/>
+          </a:xfrm>
+          <a:prstGeom prst="line">
+            <a:avLst/>
+          </a:prstGeom>
+          <a:noFill/>
+        </p:spPr>
+        <p:style>
+          <a:lnRef idx="2">
+            <a:schemeClr val="accent1">
+              <a:shade val="50000"/>
+            </a:schemeClr>
+          </a:lnRef>
+          <a:fillRef idx="1">
+            <a:schemeClr val="accent1"/>
+          </a:fillRef>
+          <a:effectRef idx="0">
+            <a:schemeClr val="accent1"/>
+          </a:effectRef>
+          <a:fontRef idx="minor">
+            <a:schemeClr val="lt1"/>
+          </a:fontRef>
+        </p:style>
+      </p:cxnSp>
+      <p:cxnSp>
+        <p:nvCxnSpPr>
+          <p:cNvPr id="30" name="Straight Connector 29"/>
+          <p:cNvCxnSpPr/>
+          <p:nvPr/>
+        </p:nvCxnSpPr>
+        <p:spPr>
+          <a:xfrm>
+            <a:off x="539552" y="3930919"/>
+            <a:ext cx="0" cy="648072"/>
+          </a:xfrm>
+          <a:prstGeom prst="line">
+            <a:avLst/>
+          </a:prstGeom>
+          <a:noFill/>
+        </p:spPr>
+        <p:style>
+          <a:lnRef idx="2">
+            <a:schemeClr val="accent1">
+              <a:shade val="50000"/>
+            </a:schemeClr>
+          </a:lnRef>
+          <a:fillRef idx="1">
+            <a:schemeClr val="accent1"/>
+          </a:fillRef>
+          <a:effectRef idx="0">
+            <a:schemeClr val="accent1"/>
+          </a:effectRef>
+          <a:fontRef idx="minor">
+            <a:schemeClr val="lt1"/>
+          </a:fontRef>
+        </p:style>
+      </p:cxnSp>
+      <p:cxnSp>
+        <p:nvCxnSpPr>
+          <p:cNvPr id="31" name="Straight Connector 30"/>
+          <p:cNvCxnSpPr/>
+          <p:nvPr/>
+        </p:nvCxnSpPr>
+        <p:spPr>
+          <a:xfrm flipH="1">
+            <a:off x="539552" y="3930919"/>
+            <a:ext cx="152400" cy="144016"/>
+          </a:xfrm>
+          <a:prstGeom prst="line">
+            <a:avLst/>
+          </a:prstGeom>
+          <a:noFill/>
+        </p:spPr>
+        <p:style>
+          <a:lnRef idx="2">
+            <a:schemeClr val="accent1">
+              <a:shade val="50000"/>
+            </a:schemeClr>
+          </a:lnRef>
+          <a:fillRef idx="1">
+            <a:schemeClr val="accent1"/>
+          </a:fillRef>
+          <a:effectRef idx="0">
+            <a:schemeClr val="accent1"/>
+          </a:effectRef>
+          <a:fontRef idx="minor">
+            <a:schemeClr val="lt1"/>
+          </a:fontRef>
+        </p:style>
+      </p:cxnSp>
+      <p:cxnSp>
+        <p:nvCxnSpPr>
+          <p:cNvPr id="32" name="Straight Connector 31"/>
+          <p:cNvCxnSpPr/>
+          <p:nvPr/>
+        </p:nvCxnSpPr>
+        <p:spPr>
+          <a:xfrm>
+            <a:off x="395536" y="3930919"/>
+            <a:ext cx="152400" cy="144016"/>
+          </a:xfrm>
+          <a:prstGeom prst="line">
+            <a:avLst/>
+          </a:prstGeom>
+          <a:noFill/>
+        </p:spPr>
+        <p:style>
+          <a:lnRef idx="2">
+            <a:schemeClr val="accent1">
+              <a:shade val="50000"/>
+            </a:schemeClr>
+          </a:lnRef>
+          <a:fillRef idx="1">
+            <a:schemeClr val="accent1"/>
+          </a:fillRef>
+          <a:effectRef idx="0">
+            <a:schemeClr val="accent1"/>
+          </a:effectRef>
+          <a:fontRef idx="minor">
+            <a:schemeClr val="lt1"/>
+          </a:fontRef>
+        </p:style>
+      </p:cxnSp>
+      <p:sp>
+        <p:nvSpPr>
+          <p:cNvPr id="33" name="Flowchart: Process 32"/>
+          <p:cNvSpPr/>
+          <p:nvPr/>
+        </p:nvSpPr>
+        <p:spPr>
+          <a:xfrm>
+            <a:off x="3419872" y="2564904"/>
+            <a:ext cx="1512168" cy="504056"/>
+          </a:xfrm>
+          <a:prstGeom prst="flowChartProcess">
+            <a:avLst/>
+          </a:prstGeom>
+          <a:noFill/>
+        </p:spPr>
+        <p:style>
+          <a:lnRef idx="2">
+            <a:schemeClr val="accent1">
+              <a:shade val="50000"/>
+            </a:schemeClr>
+          </a:lnRef>
+          <a:fillRef idx="1">
+            <a:schemeClr val="accent1"/>
+          </a:fillRef>
+          <a:effectRef idx="0">
+            <a:schemeClr val="accent1"/>
+          </a:effectRef>
+          <a:fontRef idx="minor">
+            <a:schemeClr val="lt1"/>
+          </a:fontRef>
+        </p:style>
+        <p:txBody>
+          <a:bodyPr rtlCol="0" anchor="ctr"/>
+          <a:lstStyle/>
+          <a:p>
+            <a:pPr algn="ctr"/>
+            <a:r>
+              <a:rPr lang="nl-NL" dirty="0" err="1" smtClean="0">
+                <a:solidFill>
+                  <a:schemeClr val="tx1"/>
+                </a:solidFill>
+              </a:rPr>
+              <a:t>Kafka</a:t>
+            </a:r>
+            <a:r>
+              <a:rPr lang="nl-NL" dirty="0" smtClean="0">
+                <a:solidFill>
+                  <a:schemeClr val="tx1"/>
+                </a:solidFill>
+              </a:rPr>
+              <a:t> Broker</a:t>
+            </a:r>
+            <a:endParaRPr lang="nl-NL" dirty="0">
+              <a:solidFill>
+                <a:schemeClr val="tx1"/>
+              </a:solidFill>
+            </a:endParaRPr>
+          </a:p>
+        </p:txBody>
+      </p:sp>
+      <p:sp>
+        <p:nvSpPr>
+          <p:cNvPr id="34" name="Flowchart: Process 33"/>
+          <p:cNvSpPr/>
+          <p:nvPr/>
+        </p:nvSpPr>
+        <p:spPr>
+          <a:xfrm>
+            <a:off x="3419872" y="3212976"/>
+            <a:ext cx="1512168" cy="504056"/>
+          </a:xfrm>
+          <a:prstGeom prst="flowChartProcess">
+            <a:avLst/>
+          </a:prstGeom>
+          <a:noFill/>
+        </p:spPr>
+        <p:style>
+          <a:lnRef idx="2">
+            <a:schemeClr val="accent1">
+              <a:shade val="50000"/>
+            </a:schemeClr>
+          </a:lnRef>
+          <a:fillRef idx="1">
+            <a:schemeClr val="accent1"/>
+          </a:fillRef>
+          <a:effectRef idx="0">
+            <a:schemeClr val="accent1"/>
+          </a:effectRef>
+          <a:fontRef idx="minor">
+            <a:schemeClr val="lt1"/>
+          </a:fontRef>
+        </p:style>
+        <p:txBody>
+          <a:bodyPr rtlCol="0" anchor="ctr"/>
+          <a:lstStyle/>
+          <a:p>
+            <a:pPr algn="ctr"/>
+            <a:r>
+              <a:rPr lang="nl-NL" dirty="0" err="1" smtClean="0">
+                <a:solidFill>
+                  <a:schemeClr val="tx1"/>
+                </a:solidFill>
+              </a:rPr>
+              <a:t>Kafka</a:t>
+            </a:r>
+            <a:r>
+              <a:rPr lang="nl-NL" dirty="0" smtClean="0">
+                <a:solidFill>
+                  <a:schemeClr val="tx1"/>
+                </a:solidFill>
+              </a:rPr>
+              <a:t> Broker</a:t>
+            </a:r>
+            <a:endParaRPr lang="nl-NL" dirty="0">
+              <a:solidFill>
+                <a:schemeClr val="tx1"/>
+              </a:solidFill>
+            </a:endParaRPr>
+          </a:p>
+        </p:txBody>
+      </p:sp>
+      <p:sp>
+        <p:nvSpPr>
+          <p:cNvPr id="35" name="Flowchart: Process 34"/>
+          <p:cNvSpPr/>
+          <p:nvPr/>
+        </p:nvSpPr>
+        <p:spPr>
+          <a:xfrm>
+            <a:off x="3419872" y="3861048"/>
+            <a:ext cx="1512168" cy="504056"/>
+          </a:xfrm>
+          <a:prstGeom prst="flowChartProcess">
+            <a:avLst/>
+          </a:prstGeom>
+          <a:noFill/>
+        </p:spPr>
+        <p:style>
+          <a:lnRef idx="2">
+            <a:schemeClr val="accent1">
+              <a:shade val="50000"/>
+            </a:schemeClr>
+          </a:lnRef>
+          <a:fillRef idx="1">
+            <a:schemeClr val="accent1"/>
+          </a:fillRef>
+          <a:effectRef idx="0">
+            <a:schemeClr val="accent1"/>
+          </a:effectRef>
+          <a:fontRef idx="minor">
+            <a:schemeClr val="lt1"/>
+          </a:fontRef>
+        </p:style>
+        <p:txBody>
+          <a:bodyPr rtlCol="0" anchor="ctr"/>
+          <a:lstStyle/>
+          <a:p>
+            <a:pPr algn="ctr"/>
+            <a:r>
+              <a:rPr lang="nl-NL" dirty="0" err="1" smtClean="0">
+                <a:solidFill>
+                  <a:schemeClr val="tx1"/>
+                </a:solidFill>
+              </a:rPr>
+              <a:t>Kafka</a:t>
+            </a:r>
+            <a:r>
+              <a:rPr lang="nl-NL" dirty="0" smtClean="0">
+                <a:solidFill>
+                  <a:schemeClr val="tx1"/>
+                </a:solidFill>
+              </a:rPr>
+              <a:t> Broker</a:t>
+            </a:r>
+          </a:p>
+        </p:txBody>
+      </p:sp>
+      <p:sp>
+        <p:nvSpPr>
+          <p:cNvPr id="36" name="Flowchart: Magnetic Disk 35"/>
+          <p:cNvSpPr/>
+          <p:nvPr/>
+        </p:nvSpPr>
+        <p:spPr>
+          <a:xfrm>
+            <a:off x="3599892" y="4761148"/>
+            <a:ext cx="1152128" cy="612068"/>
+          </a:xfrm>
+          <a:prstGeom prst="flowChartMagneticDisk">
+            <a:avLst/>
+          </a:prstGeom>
+          <a:noFill/>
+        </p:spPr>
+        <p:style>
+          <a:lnRef idx="2">
+            <a:schemeClr val="accent1">
+              <a:shade val="50000"/>
+            </a:schemeClr>
+          </a:lnRef>
+          <a:fillRef idx="1">
+            <a:schemeClr val="accent1"/>
+          </a:fillRef>
+          <a:effectRef idx="0">
+            <a:schemeClr val="accent1"/>
+          </a:effectRef>
+          <a:fontRef idx="minor">
+            <a:schemeClr val="lt1"/>
+          </a:fontRef>
+        </p:style>
+        <p:txBody>
+          <a:bodyPr rtlCol="0" anchor="ctr"/>
+          <a:lstStyle/>
+          <a:p>
+            <a:pPr algn="ctr"/>
+            <a:r>
+              <a:rPr lang="nl-NL" sz="1600" dirty="0" err="1" smtClean="0">
+                <a:solidFill>
+                  <a:schemeClr val="tx1"/>
+                </a:solidFill>
+              </a:rPr>
+              <a:t>Zookeeper</a:t>
+            </a:r>
+            <a:endParaRPr lang="nl-NL" sz="1600" dirty="0">
+              <a:solidFill>
+                <a:schemeClr val="tx1"/>
+              </a:solidFill>
+            </a:endParaRPr>
+          </a:p>
+        </p:txBody>
+      </p:sp>
+      <p:cxnSp>
+        <p:nvCxnSpPr>
+          <p:cNvPr id="38" name="Straight Connector 37"/>
+          <p:cNvCxnSpPr>
+            <a:stCxn id="9" idx="3"/>
+            <a:endCxn id="33" idx="1"/>
+          </p:cNvCxnSpPr>
+          <p:nvPr/>
+        </p:nvCxnSpPr>
+        <p:spPr>
+          <a:xfrm>
+            <a:off x="2915816" y="2528900"/>
+            <a:ext cx="504056" cy="288032"/>
+          </a:xfrm>
+          <a:prstGeom prst="line">
+            <a:avLst/>
+          </a:prstGeom>
+          <a:ln w="12700">
+            <a:solidFill>
+              <a:schemeClr val="tx2"/>
+            </a:solidFill>
+          </a:ln>
+        </p:spPr>
+        <p:style>
+          <a:lnRef idx="1">
+            <a:schemeClr val="accent1"/>
+          </a:lnRef>
+          <a:fillRef idx="0">
+            <a:schemeClr val="accent1"/>
+          </a:fillRef>
+          <a:effectRef idx="0">
+            <a:schemeClr val="accent1"/>
+          </a:effectRef>
+          <a:fontRef idx="minor">
+            <a:schemeClr val="tx1"/>
+          </a:fontRef>
+        </p:style>
+      </p:cxnSp>
+      <p:cxnSp>
+        <p:nvCxnSpPr>
+          <p:cNvPr id="40" name="Straight Connector 39"/>
+          <p:cNvCxnSpPr>
+            <a:stCxn id="9" idx="3"/>
+            <a:endCxn id="34" idx="1"/>
+          </p:cNvCxnSpPr>
+          <p:nvPr/>
+        </p:nvCxnSpPr>
+        <p:spPr>
+          <a:xfrm>
+            <a:off x="2915816" y="2528900"/>
+            <a:ext cx="504056" cy="936104"/>
+          </a:xfrm>
+          <a:prstGeom prst="line">
+            <a:avLst/>
+          </a:prstGeom>
+          <a:ln w="12700">
+            <a:solidFill>
+              <a:schemeClr val="tx2"/>
+            </a:solidFill>
+          </a:ln>
+        </p:spPr>
+        <p:style>
+          <a:lnRef idx="1">
+            <a:schemeClr val="accent1"/>
+          </a:lnRef>
+          <a:fillRef idx="0">
+            <a:schemeClr val="accent1"/>
+          </a:fillRef>
+          <a:effectRef idx="0">
+            <a:schemeClr val="accent1"/>
+          </a:effectRef>
+          <a:fontRef idx="minor">
+            <a:schemeClr val="tx1"/>
+          </a:fontRef>
+        </p:style>
+      </p:cxnSp>
+      <p:cxnSp>
+        <p:nvCxnSpPr>
+          <p:cNvPr id="43" name="Straight Connector 42"/>
+          <p:cNvCxnSpPr>
+            <a:stCxn id="9" idx="3"/>
+            <a:endCxn id="35" idx="1"/>
+          </p:cNvCxnSpPr>
+          <p:nvPr/>
+        </p:nvCxnSpPr>
+        <p:spPr>
+          <a:xfrm>
+            <a:off x="2915816" y="2528900"/>
+            <a:ext cx="504056" cy="1584176"/>
+          </a:xfrm>
+          <a:prstGeom prst="line">
+            <a:avLst/>
+          </a:prstGeom>
+          <a:ln w="12700">
+            <a:solidFill>
+              <a:schemeClr val="tx2"/>
+            </a:solidFill>
+          </a:ln>
+        </p:spPr>
+        <p:style>
+          <a:lnRef idx="1">
+            <a:schemeClr val="accent1"/>
+          </a:lnRef>
+          <a:fillRef idx="0">
+            <a:schemeClr val="accent1"/>
+          </a:fillRef>
+          <a:effectRef idx="0">
+            <a:schemeClr val="accent1"/>
+          </a:effectRef>
+          <a:fontRef idx="minor">
+            <a:schemeClr val="tx1"/>
+          </a:fontRef>
+        </p:style>
+      </p:cxnSp>
+      <p:cxnSp>
+        <p:nvCxnSpPr>
+          <p:cNvPr id="46" name="Straight Connector 45"/>
+          <p:cNvCxnSpPr>
+            <a:stCxn id="22" idx="3"/>
+            <a:endCxn id="33" idx="1"/>
+          </p:cNvCxnSpPr>
+          <p:nvPr/>
+        </p:nvCxnSpPr>
+        <p:spPr>
+          <a:xfrm flipV="1">
+            <a:off x="2915816" y="2816932"/>
+            <a:ext cx="504056" cy="2232248"/>
+          </a:xfrm>
+          <a:prstGeom prst="line">
+            <a:avLst/>
+          </a:prstGeom>
+          <a:ln w="12700">
+            <a:solidFill>
+              <a:schemeClr val="tx2"/>
+            </a:solidFill>
+          </a:ln>
+        </p:spPr>
+        <p:style>
+          <a:lnRef idx="1">
+            <a:schemeClr val="accent1"/>
+          </a:lnRef>
+          <a:fillRef idx="0">
+            <a:schemeClr val="accent1"/>
+          </a:fillRef>
+          <a:effectRef idx="0">
+            <a:schemeClr val="accent1"/>
+          </a:effectRef>
+          <a:fontRef idx="minor">
+            <a:schemeClr val="tx1"/>
+          </a:fontRef>
+        </p:style>
+      </p:cxnSp>
+      <p:cxnSp>
+        <p:nvCxnSpPr>
+          <p:cNvPr id="49" name="Straight Connector 48"/>
+          <p:cNvCxnSpPr>
+            <a:stCxn id="22" idx="3"/>
+            <a:endCxn id="34" idx="1"/>
+          </p:cNvCxnSpPr>
+          <p:nvPr/>
+        </p:nvCxnSpPr>
+        <p:spPr>
+          <a:xfrm flipV="1">
+            <a:off x="2915816" y="3465004"/>
+            <a:ext cx="504056" cy="1584176"/>
+          </a:xfrm>
+          <a:prstGeom prst="line">
+            <a:avLst/>
+          </a:prstGeom>
+          <a:ln w="12700">
+            <a:solidFill>
+              <a:schemeClr val="tx2"/>
+            </a:solidFill>
+          </a:ln>
+        </p:spPr>
+        <p:style>
+          <a:lnRef idx="1">
+            <a:schemeClr val="accent1"/>
+          </a:lnRef>
+          <a:fillRef idx="0">
+            <a:schemeClr val="accent1"/>
+          </a:fillRef>
+          <a:effectRef idx="0">
+            <a:schemeClr val="accent1"/>
+          </a:effectRef>
+          <a:fontRef idx="minor">
+            <a:schemeClr val="tx1"/>
+          </a:fontRef>
+        </p:style>
+      </p:cxnSp>
+      <p:cxnSp>
+        <p:nvCxnSpPr>
+          <p:cNvPr id="52" name="Straight Connector 51"/>
+          <p:cNvCxnSpPr>
+            <a:stCxn id="22" idx="3"/>
+            <a:endCxn id="35" idx="1"/>
+          </p:cNvCxnSpPr>
+          <p:nvPr/>
+        </p:nvCxnSpPr>
+        <p:spPr>
+          <a:xfrm flipV="1">
+            <a:off x="2915816" y="4113076"/>
+            <a:ext cx="504056" cy="936104"/>
+          </a:xfrm>
+          <a:prstGeom prst="line">
+            <a:avLst/>
+          </a:prstGeom>
+          <a:ln w="12700">
+            <a:solidFill>
+              <a:schemeClr val="tx2"/>
+            </a:solidFill>
+          </a:ln>
+        </p:spPr>
+        <p:style>
+          <a:lnRef idx="1">
+            <a:schemeClr val="accent1"/>
+          </a:lnRef>
+          <a:fillRef idx="0">
+            <a:schemeClr val="accent1"/>
+          </a:fillRef>
+          <a:effectRef idx="0">
+            <a:schemeClr val="accent1"/>
+          </a:effectRef>
+          <a:fontRef idx="minor">
+            <a:schemeClr val="tx1"/>
+          </a:fontRef>
+        </p:style>
+      </p:cxnSp>
+      <p:sp>
+        <p:nvSpPr>
+          <p:cNvPr id="55" name="Flowchart: Process 54"/>
+          <p:cNvSpPr/>
+          <p:nvPr/>
+        </p:nvSpPr>
+        <p:spPr>
+          <a:xfrm>
+            <a:off x="5220072" y="2708920"/>
+            <a:ext cx="1512168" cy="504056"/>
+          </a:xfrm>
+          <a:prstGeom prst="flowChartProcess">
+            <a:avLst/>
+          </a:prstGeom>
+          <a:noFill/>
+        </p:spPr>
+        <p:style>
+          <a:lnRef idx="2">
+            <a:schemeClr val="accent1">
+              <a:shade val="50000"/>
+            </a:schemeClr>
+          </a:lnRef>
+          <a:fillRef idx="1">
+            <a:schemeClr val="accent1"/>
+          </a:fillRef>
+          <a:effectRef idx="0">
+            <a:schemeClr val="accent1"/>
+          </a:effectRef>
+          <a:fontRef idx="minor">
+            <a:schemeClr val="lt1"/>
+          </a:fontRef>
+        </p:style>
+        <p:txBody>
+          <a:bodyPr rtlCol="0" anchor="ctr"/>
+          <a:lstStyle/>
+          <a:p>
+            <a:pPr algn="ctr"/>
+            <a:r>
+              <a:rPr lang="nl-NL" sz="1600" dirty="0" err="1" smtClean="0">
+                <a:solidFill>
+                  <a:schemeClr val="tx1"/>
+                </a:solidFill>
+              </a:rPr>
+              <a:t>Kafka</a:t>
+            </a:r>
+            <a:r>
+              <a:rPr lang="nl-NL" sz="1600" dirty="0" smtClean="0">
+                <a:solidFill>
+                  <a:schemeClr val="tx1"/>
+                </a:solidFill>
+              </a:rPr>
+              <a:t> </a:t>
+            </a:r>
+            <a:r>
+              <a:rPr lang="nl-NL" sz="1600" dirty="0" err="1" smtClean="0">
+                <a:solidFill>
+                  <a:schemeClr val="tx1"/>
+                </a:solidFill>
+              </a:rPr>
+              <a:t>consumer</a:t>
+            </a:r>
+            <a:endParaRPr lang="nl-NL" sz="1600" dirty="0">
+              <a:solidFill>
+                <a:schemeClr val="tx1"/>
+              </a:solidFill>
+            </a:endParaRPr>
+          </a:p>
+        </p:txBody>
+      </p:sp>
+      <p:sp>
+        <p:nvSpPr>
+          <p:cNvPr id="57" name="Flowchart: Magnetic Disk 56"/>
+          <p:cNvSpPr/>
+          <p:nvPr/>
+        </p:nvSpPr>
+        <p:spPr>
+          <a:xfrm>
+            <a:off x="7356141" y="2661816"/>
+            <a:ext cx="1152128" cy="612068"/>
+          </a:xfrm>
+          <a:prstGeom prst="flowChartMagneticDisk">
+            <a:avLst/>
+          </a:prstGeom>
+          <a:noFill/>
+        </p:spPr>
+        <p:style>
+          <a:lnRef idx="2">
+            <a:schemeClr val="accent1">
+              <a:shade val="50000"/>
+            </a:schemeClr>
+          </a:lnRef>
+          <a:fillRef idx="1">
+            <a:schemeClr val="accent1"/>
+          </a:fillRef>
+          <a:effectRef idx="0">
+            <a:schemeClr val="accent1"/>
+          </a:effectRef>
+          <a:fontRef idx="minor">
+            <a:schemeClr val="lt1"/>
+          </a:fontRef>
+        </p:style>
+        <p:txBody>
+          <a:bodyPr rtlCol="0" anchor="ctr"/>
+          <a:lstStyle/>
+          <a:p>
+            <a:pPr algn="ctr"/>
+            <a:r>
+              <a:rPr lang="nl-NL" sz="1600" dirty="0" err="1" smtClean="0">
+                <a:solidFill>
+                  <a:schemeClr val="tx1"/>
+                </a:solidFill>
+              </a:rPr>
+              <a:t>HBase</a:t>
+            </a:r>
+            <a:endParaRPr lang="nl-NL" sz="1600" dirty="0">
+              <a:solidFill>
+                <a:schemeClr val="tx1"/>
+              </a:solidFill>
+            </a:endParaRPr>
+          </a:p>
+        </p:txBody>
+      </p:sp>
+      <p:sp>
+        <p:nvSpPr>
+          <p:cNvPr id="58" name="Flowchart: Magnetic Disk 57"/>
+          <p:cNvSpPr/>
+          <p:nvPr/>
+        </p:nvSpPr>
+        <p:spPr>
+          <a:xfrm>
+            <a:off x="6045212" y="3537012"/>
+            <a:ext cx="1152128" cy="756084"/>
+          </a:xfrm>
+          <a:prstGeom prst="flowChartMagneticDisk">
+            <a:avLst/>
+          </a:prstGeom>
+          <a:noFill/>
+        </p:spPr>
+        <p:style>
+          <a:lnRef idx="2">
+            <a:schemeClr val="accent1">
+              <a:shade val="50000"/>
+            </a:schemeClr>
+          </a:lnRef>
+          <a:fillRef idx="1">
+            <a:schemeClr val="accent1"/>
+          </a:fillRef>
+          <a:effectRef idx="0">
+            <a:schemeClr val="accent1"/>
+          </a:effectRef>
+          <a:fontRef idx="minor">
+            <a:schemeClr val="lt1"/>
+          </a:fontRef>
+        </p:style>
+        <p:txBody>
+          <a:bodyPr rtlCol="0" anchor="ctr"/>
+          <a:lstStyle/>
+          <a:p>
+            <a:pPr algn="ctr"/>
+            <a:r>
+              <a:rPr lang="nl-NL" sz="1600" dirty="0" smtClean="0">
+                <a:solidFill>
+                  <a:schemeClr val="tx1"/>
+                </a:solidFill>
+              </a:rPr>
+              <a:t>HDFS</a:t>
+            </a:r>
+            <a:endParaRPr lang="nl-NL" sz="1600" dirty="0">
+              <a:solidFill>
+                <a:schemeClr val="tx1"/>
+              </a:solidFill>
+            </a:endParaRPr>
+          </a:p>
+        </p:txBody>
+      </p:sp>
+      <p:sp>
+        <p:nvSpPr>
+          <p:cNvPr id="60" name="Flowchart: Process 59"/>
+          <p:cNvSpPr/>
+          <p:nvPr/>
+        </p:nvSpPr>
+        <p:spPr>
+          <a:xfrm>
+            <a:off x="6264188" y="4632672"/>
+            <a:ext cx="1512168" cy="504056"/>
+          </a:xfrm>
+          <a:prstGeom prst="flowChartProcess">
+            <a:avLst/>
+          </a:prstGeom>
+          <a:noFill/>
+        </p:spPr>
+        <p:style>
+          <a:lnRef idx="2">
+            <a:schemeClr val="accent1">
+              <a:shade val="50000"/>
+            </a:schemeClr>
+          </a:lnRef>
+          <a:fillRef idx="1">
+            <a:schemeClr val="accent1"/>
+          </a:fillRef>
+          <a:effectRef idx="0">
+            <a:schemeClr val="accent1"/>
+          </a:effectRef>
+          <a:fontRef idx="minor">
+            <a:schemeClr val="lt1"/>
+          </a:fontRef>
+        </p:style>
+        <p:txBody>
+          <a:bodyPr rtlCol="0" anchor="ctr"/>
+          <a:lstStyle/>
+          <a:p>
+            <a:pPr algn="ctr"/>
+            <a:r>
+              <a:rPr lang="nl-NL" sz="1600" dirty="0" err="1" smtClean="0">
+                <a:solidFill>
+                  <a:schemeClr val="tx1"/>
+                </a:solidFill>
+              </a:rPr>
+              <a:t>Spark</a:t>
+            </a:r>
+            <a:endParaRPr lang="nl-NL" sz="1600" dirty="0">
+              <a:solidFill>
+                <a:schemeClr val="tx1"/>
+              </a:solidFill>
+            </a:endParaRPr>
+          </a:p>
+        </p:txBody>
+      </p:sp>
+      <p:pic>
+        <p:nvPicPr>
+          <p:cNvPr id="2050" name="Picture 2" descr="http://www.grameen-info.org/wp-content/uploads/2014/12/Monthly-Reports.png"/>
+          <p:cNvPicPr>
+            <a:picLocks noChangeAspect="1" noChangeArrowheads="1"/>
+          </p:cNvPicPr>
+          <p:nvPr/>
+        </p:nvPicPr>
+        <p:blipFill>
+          <a:blip r:embed="rId2" cstate="print">
+            <a:extLst>
+              <a:ext uri="{28A0092B-C50C-407E-A947-70E740481C1C}">
+                <a14:useLocalDpi xmlns:a14="http://schemas.microsoft.com/office/drawing/2010/main" val="0"/>
+              </a:ext>
+            </a:extLst>
+          </a:blip>
+          <a:srcRect/>
+          <a:stretch>
+            <a:fillRect/>
+          </a:stretch>
+        </p:blipFill>
+        <p:spPr bwMode="auto">
+          <a:xfrm>
+            <a:off x="5196649" y="5552782"/>
+            <a:ext cx="1308909" cy="947401"/>
+          </a:xfrm>
+          <a:prstGeom prst="rect">
+            <a:avLst/>
+          </a:prstGeom>
+          <a:noFill/>
+          <a:extLst>
+            <a:ext uri="{909E8E84-426E-40DD-AFC4-6F175D3DCCD1}">
+              <a14:hiddenFill xmlns:a14="http://schemas.microsoft.com/office/drawing/2010/main">
+                <a:solidFill>
+                  <a:srgbClr val="FFFFFF"/>
+                </a:solidFill>
+              </a14:hiddenFill>
+            </a:ext>
+          </a:extLst>
+        </p:spPr>
+      </p:pic>
+      <p:pic>
+        <p:nvPicPr>
+          <p:cNvPr id="2052" name="Picture 4" descr="The Guardian's interactive map of current flights"/>
+          <p:cNvPicPr>
+            <a:picLocks noChangeAspect="1" noChangeArrowheads="1"/>
+          </p:cNvPicPr>
+          <p:nvPr/>
+        </p:nvPicPr>
+        <p:blipFill>
+          <a:blip r:embed="rId3" cstate="print">
+            <a:extLst>
+              <a:ext uri="{28A0092B-C50C-407E-A947-70E740481C1C}">
+                <a14:useLocalDpi xmlns:a14="http://schemas.microsoft.com/office/drawing/2010/main" val="0"/>
+              </a:ext>
+            </a:extLst>
+          </a:blip>
+          <a:srcRect/>
+          <a:stretch>
+            <a:fillRect/>
+          </a:stretch>
+        </p:blipFill>
+        <p:spPr bwMode="auto">
+          <a:xfrm>
+            <a:off x="6736964" y="5661248"/>
+            <a:ext cx="1771305" cy="711108"/>
+          </a:xfrm>
+          <a:prstGeom prst="rect">
+            <a:avLst/>
+          </a:prstGeom>
+          <a:noFill/>
+          <a:extLst>
+            <a:ext uri="{909E8E84-426E-40DD-AFC4-6F175D3DCCD1}">
+              <a14:hiddenFill xmlns:a14="http://schemas.microsoft.com/office/drawing/2010/main">
+                <a:solidFill>
+                  <a:srgbClr val="FFFFFF"/>
+                </a:solidFill>
+              </a14:hiddenFill>
+            </a:ext>
+          </a:extLst>
+        </p:spPr>
+      </p:pic>
+      <p:cxnSp>
+        <p:nvCxnSpPr>
+          <p:cNvPr id="64" name="Straight Connector 63"/>
+          <p:cNvCxnSpPr>
+            <a:stCxn id="33" idx="3"/>
+            <a:endCxn id="55" idx="1"/>
+          </p:cNvCxnSpPr>
+          <p:nvPr/>
+        </p:nvCxnSpPr>
+        <p:spPr>
+          <a:xfrm>
+            <a:off x="4932040" y="2816932"/>
+            <a:ext cx="288032" cy="144016"/>
+          </a:xfrm>
+          <a:prstGeom prst="line">
+            <a:avLst/>
+          </a:prstGeom>
+          <a:ln w="12700">
+            <a:solidFill>
+              <a:schemeClr val="tx2"/>
+            </a:solidFill>
+          </a:ln>
+        </p:spPr>
+        <p:style>
+          <a:lnRef idx="1">
+            <a:schemeClr val="accent1"/>
+          </a:lnRef>
+          <a:fillRef idx="0">
+            <a:schemeClr val="accent1"/>
+          </a:fillRef>
+          <a:effectRef idx="0">
+            <a:schemeClr val="accent1"/>
+          </a:effectRef>
+          <a:fontRef idx="minor">
+            <a:schemeClr val="tx1"/>
+          </a:fontRef>
+        </p:style>
+      </p:cxnSp>
+      <p:cxnSp>
+        <p:nvCxnSpPr>
+          <p:cNvPr id="67" name="Straight Connector 66"/>
+          <p:cNvCxnSpPr>
+            <a:stCxn id="34" idx="3"/>
+            <a:endCxn id="55" idx="1"/>
+          </p:cNvCxnSpPr>
+          <p:nvPr/>
+        </p:nvCxnSpPr>
+        <p:spPr>
+          <a:xfrm flipV="1">
+            <a:off x="4932040" y="2960948"/>
+            <a:ext cx="288032" cy="504056"/>
+          </a:xfrm>
+          <a:prstGeom prst="line">
+            <a:avLst/>
+          </a:prstGeom>
+          <a:ln w="12700">
+            <a:solidFill>
+              <a:schemeClr val="tx2"/>
+            </a:solidFill>
+          </a:ln>
+        </p:spPr>
+        <p:style>
+          <a:lnRef idx="1">
+            <a:schemeClr val="accent1"/>
+          </a:lnRef>
+          <a:fillRef idx="0">
+            <a:schemeClr val="accent1"/>
+          </a:fillRef>
+          <a:effectRef idx="0">
+            <a:schemeClr val="accent1"/>
+          </a:effectRef>
+          <a:fontRef idx="minor">
+            <a:schemeClr val="tx1"/>
+          </a:fontRef>
+        </p:style>
+      </p:cxnSp>
+      <p:cxnSp>
+        <p:nvCxnSpPr>
+          <p:cNvPr id="71" name="Straight Connector 70"/>
+          <p:cNvCxnSpPr>
+            <a:stCxn id="35" idx="3"/>
+            <a:endCxn id="55" idx="1"/>
+          </p:cNvCxnSpPr>
+          <p:nvPr/>
+        </p:nvCxnSpPr>
+        <p:spPr>
+          <a:xfrm flipV="1">
+            <a:off x="4932040" y="2960948"/>
+            <a:ext cx="288032" cy="1152128"/>
+          </a:xfrm>
+          <a:prstGeom prst="line">
+            <a:avLst/>
+          </a:prstGeom>
+          <a:ln w="12700">
+            <a:solidFill>
+              <a:schemeClr val="tx2"/>
+            </a:solidFill>
+          </a:ln>
+        </p:spPr>
+        <p:style>
+          <a:lnRef idx="1">
+            <a:schemeClr val="accent1"/>
+          </a:lnRef>
+          <a:fillRef idx="0">
+            <a:schemeClr val="accent1"/>
+          </a:fillRef>
+          <a:effectRef idx="0">
+            <a:schemeClr val="accent1"/>
+          </a:effectRef>
+          <a:fontRef idx="minor">
+            <a:schemeClr val="tx1"/>
+          </a:fontRef>
+        </p:style>
+      </p:cxnSp>
+      <p:cxnSp>
+        <p:nvCxnSpPr>
+          <p:cNvPr id="74" name="Straight Connector 73"/>
+          <p:cNvCxnSpPr>
+            <a:stCxn id="57" idx="2"/>
+            <a:endCxn id="55" idx="3"/>
+          </p:cNvCxnSpPr>
+          <p:nvPr/>
+        </p:nvCxnSpPr>
+        <p:spPr>
+          <a:xfrm flipH="1" flipV="1">
+            <a:off x="6732240" y="2960948"/>
+            <a:ext cx="623901" cy="6902"/>
+          </a:xfrm>
+          <a:prstGeom prst="line">
+            <a:avLst/>
+          </a:prstGeom>
+          <a:ln w="12700">
+            <a:solidFill>
+              <a:schemeClr val="tx2"/>
+            </a:solidFill>
+          </a:ln>
+        </p:spPr>
+        <p:style>
+          <a:lnRef idx="1">
+            <a:schemeClr val="accent1"/>
+          </a:lnRef>
+          <a:fillRef idx="0">
+            <a:schemeClr val="accent1"/>
+          </a:fillRef>
+          <a:effectRef idx="0">
+            <a:schemeClr val="accent1"/>
+          </a:effectRef>
+          <a:fontRef idx="minor">
+            <a:schemeClr val="tx1"/>
+          </a:fontRef>
+        </p:style>
+      </p:cxnSp>
+      <p:cxnSp>
+        <p:nvCxnSpPr>
+          <p:cNvPr id="77" name="Straight Connector 76"/>
+          <p:cNvCxnSpPr/>
+          <p:nvPr/>
+        </p:nvCxnSpPr>
+        <p:spPr>
+          <a:xfrm flipH="1" flipV="1">
+            <a:off x="6156178" y="3212976"/>
+            <a:ext cx="279510" cy="324036"/>
+          </a:xfrm>
+          <a:prstGeom prst="line">
+            <a:avLst/>
+          </a:prstGeom>
+          <a:ln w="12700">
+            <a:solidFill>
+              <a:schemeClr val="tx2"/>
+            </a:solidFill>
+          </a:ln>
+        </p:spPr>
+        <p:style>
+          <a:lnRef idx="1">
+            <a:schemeClr val="accent1"/>
+          </a:lnRef>
+          <a:fillRef idx="0">
+            <a:schemeClr val="accent1"/>
+          </a:fillRef>
+          <a:effectRef idx="0">
+            <a:schemeClr val="accent1"/>
+          </a:effectRef>
+          <a:fontRef idx="minor">
+            <a:schemeClr val="tx1"/>
+          </a:fontRef>
+        </p:style>
+      </p:cxnSp>
+      <p:cxnSp>
+        <p:nvCxnSpPr>
+          <p:cNvPr id="80" name="Straight Connector 79"/>
+          <p:cNvCxnSpPr>
+            <a:stCxn id="60" idx="0"/>
+          </p:cNvCxnSpPr>
+          <p:nvPr/>
+        </p:nvCxnSpPr>
+        <p:spPr>
+          <a:xfrm flipH="1" flipV="1">
+            <a:off x="6736964" y="4254955"/>
+            <a:ext cx="283308" cy="377717"/>
+          </a:xfrm>
+          <a:prstGeom prst="line">
+            <a:avLst/>
+          </a:prstGeom>
+          <a:ln w="12700">
+            <a:solidFill>
+              <a:schemeClr val="tx2"/>
+            </a:solidFill>
+          </a:ln>
+        </p:spPr>
+        <p:style>
+          <a:lnRef idx="1">
+            <a:schemeClr val="accent1"/>
+          </a:lnRef>
+          <a:fillRef idx="0">
+            <a:schemeClr val="accent1"/>
+          </a:fillRef>
+          <a:effectRef idx="0">
+            <a:schemeClr val="accent1"/>
+          </a:effectRef>
+          <a:fontRef idx="minor">
+            <a:schemeClr val="tx1"/>
+          </a:fontRef>
+        </p:style>
+      </p:cxnSp>
+      <p:cxnSp>
+        <p:nvCxnSpPr>
+          <p:cNvPr id="86" name="Straight Connector 85"/>
+          <p:cNvCxnSpPr>
+            <a:stCxn id="2050" idx="0"/>
+            <a:endCxn id="60" idx="2"/>
+          </p:cNvCxnSpPr>
+          <p:nvPr/>
+        </p:nvCxnSpPr>
+        <p:spPr>
+          <a:xfrm flipV="1">
+            <a:off x="5851104" y="5136728"/>
+            <a:ext cx="1169168" cy="416054"/>
+          </a:xfrm>
+          <a:prstGeom prst="line">
+            <a:avLst/>
+          </a:prstGeom>
+          <a:ln w="12700">
+            <a:solidFill>
+              <a:schemeClr val="tx2"/>
+            </a:solidFill>
+          </a:ln>
+        </p:spPr>
+        <p:style>
+          <a:lnRef idx="1">
+            <a:schemeClr val="accent1"/>
+          </a:lnRef>
+          <a:fillRef idx="0">
+            <a:schemeClr val="accent1"/>
+          </a:fillRef>
+          <a:effectRef idx="0">
+            <a:schemeClr val="accent1"/>
+          </a:effectRef>
+          <a:fontRef idx="minor">
+            <a:schemeClr val="tx1"/>
+          </a:fontRef>
+        </p:style>
+      </p:cxnSp>
+      <p:cxnSp>
+        <p:nvCxnSpPr>
+          <p:cNvPr id="89" name="Straight Connector 88"/>
+          <p:cNvCxnSpPr>
+            <a:stCxn id="2052" idx="0"/>
+            <a:endCxn id="60" idx="2"/>
+          </p:cNvCxnSpPr>
+          <p:nvPr/>
+        </p:nvCxnSpPr>
+        <p:spPr>
+          <a:xfrm flipH="1" flipV="1">
+            <a:off x="7020272" y="5136728"/>
+            <a:ext cx="602345" cy="524520"/>
+          </a:xfrm>
+          <a:prstGeom prst="line">
+            <a:avLst/>
+          </a:prstGeom>
+          <a:ln w="12700">
+            <a:solidFill>
+              <a:schemeClr val="tx2"/>
+            </a:solidFill>
+          </a:ln>
+        </p:spPr>
+        <p:style>
+          <a:lnRef idx="1">
+            <a:schemeClr val="accent1"/>
+          </a:lnRef>
+          <a:fillRef idx="0">
+            <a:schemeClr val="accent1"/>
+          </a:fillRef>
+          <a:effectRef idx="0">
+            <a:schemeClr val="accent1"/>
+          </a:effectRef>
+          <a:fontRef idx="minor">
+            <a:schemeClr val="tx1"/>
+          </a:fontRef>
+        </p:style>
+      </p:cxnSp>
+    </p:spTree>
+    <p:extLst>
+      <p:ext uri="{BB962C8B-B14F-4D97-AF65-F5344CB8AC3E}">
+        <p14:creationId xmlns:p14="http://schemas.microsoft.com/office/powerpoint/2010/main" val="1855616682"/>
+      </p:ext>
+    </p:extLst>
+  </p:cSld>
+  <p:clrMapOvr>
+    <a:masterClrMapping/>
+  </p:clrMapOvr>
+</p:sld>
+</file>
+
+<file path=ppt/slides/slide7.xml><?xml version="1.0" encoding="utf-8"?>
+<p:sld xmlns:a="http://schemas.openxmlformats.org/drawingml/2006/main" xmlns:r="http://schemas.openxmlformats.org/officeDocument/2006/relationships" xmlns:p="http://schemas.openxmlformats.org/presentationml/2006/main">
+  <p:cSld>
+    <p:spTree>
+      <p:nvGrpSpPr>
+        <p:cNvPr id="1" name=""/>
+        <p:cNvGrpSpPr/>
+        <p:nvPr/>
+      </p:nvGrpSpPr>
+      <p:grpSpPr>
+        <a:xfrm>
+          <a:off x="0" y="0"/>
+          <a:ext cx="0" cy="0"/>
+          <a:chOff x="0" y="0"/>
+          <a:chExt cx="0" cy="0"/>
+        </a:xfrm>
+      </p:grpSpPr>
+      <p:sp>
+        <p:nvSpPr>
+          <p:cNvPr id="2" name="Title 1"/>
+          <p:cNvSpPr>
+            <a:spLocks noGrp="1"/>
+          </p:cNvSpPr>
+          <p:nvPr>
+            <p:ph type="title"/>
+          </p:nvPr>
+        </p:nvSpPr>
+        <p:spPr/>
+        <p:txBody>
+          <a:bodyPr/>
+          <a:lstStyle/>
+          <a:p>
+            <a:r>
+              <a:rPr lang="nl-NL" dirty="0" smtClean="0"/>
+              <a:t>Architecture (</a:t>
+            </a:r>
+            <a:r>
+              <a:rPr lang="nl-NL" dirty="0" err="1" smtClean="0"/>
+              <a:t>physical</a:t>
+            </a:r>
+            <a:r>
+              <a:rPr lang="nl-NL" dirty="0" smtClean="0"/>
+              <a:t>)</a:t>
+            </a:r>
+            <a:endParaRPr lang="nl-NL" dirty="0"/>
+          </a:p>
+        </p:txBody>
+      </p:sp>
+      <p:pic>
+        <p:nvPicPr>
+          <p:cNvPr id="3074" name="Picture 2" descr="C:\Git\plt-airt-2000\Presentation\Physical architecture.png"/>
+          <p:cNvPicPr>
+            <a:picLocks noChangeAspect="1" noChangeArrowheads="1"/>
+          </p:cNvPicPr>
+          <p:nvPr/>
+        </p:nvPicPr>
+        <p:blipFill>
+          <a:blip r:embed="rId2">
+            <a:extLst>
+              <a:ext uri="{28A0092B-C50C-407E-A947-70E740481C1C}">
+                <a14:useLocalDpi xmlns:a14="http://schemas.microsoft.com/office/drawing/2010/main" val="0"/>
+              </a:ext>
+            </a:extLst>
+          </a:blip>
+          <a:srcRect/>
+          <a:stretch>
+            <a:fillRect/>
+          </a:stretch>
+        </p:blipFill>
+        <p:spPr bwMode="auto">
+          <a:xfrm>
+            <a:off x="642389" y="1618997"/>
+            <a:ext cx="7859222" cy="3620005"/>
+          </a:xfrm>
+          <a:prstGeom prst="rect">
+            <a:avLst/>
+          </a:prstGeom>
+          <a:noFill/>
+          <a:extLst>
+            <a:ext uri="{909E8E84-426E-40DD-AFC4-6F175D3DCCD1}">
+              <a14:hiddenFill xmlns:a14="http://schemas.microsoft.com/office/drawing/2010/main">
+                <a:solidFill>
+                  <a:srgbClr val="FFFFFF"/>
+                </a:solidFill>
+              </a14:hiddenFill>
+            </a:ext>
+          </a:extLst>
+        </p:spPr>
+      </p:pic>
+    </p:spTree>
+    <p:extLst>
+      <p:ext uri="{BB962C8B-B14F-4D97-AF65-F5344CB8AC3E}">
+        <p14:creationId xmlns:p14="http://schemas.microsoft.com/office/powerpoint/2010/main" val="2223253556"/>
       </p:ext>
     </p:extLst>
   </p:cSld>

</xml_diff>